<commit_message>
algunos cambios en la presentacion
</commit_message>
<xml_diff>
--- a/Equip_B/results/S2_Presentacion_Finanzas.pptx
+++ b/Equip_B/results/S2_Presentacion_Finanzas.pptx
@@ -5,10 +5,10 @@
     <p:sldMasterId id="2147483648" r:id="rId4"/>
   </p:sldMasterIdLst>
   <p:notesMasterIdLst>
-    <p:notesMasterId r:id="rId17"/>
+    <p:notesMasterId r:id="rId15"/>
   </p:notesMasterIdLst>
   <p:handoutMasterIdLst>
-    <p:handoutMasterId r:id="rId18"/>
+    <p:handoutMasterId r:id="rId16"/>
   </p:handoutMasterIdLst>
   <p:sldIdLst>
     <p:sldId id="324" r:id="rId5"/>
@@ -19,10 +19,8 @@
     <p:sldId id="332" r:id="rId10"/>
     <p:sldId id="350" r:id="rId11"/>
     <p:sldId id="333" r:id="rId12"/>
-    <p:sldId id="334" r:id="rId13"/>
-    <p:sldId id="349" r:id="rId14"/>
-    <p:sldId id="352" r:id="rId15"/>
-    <p:sldId id="335" r:id="rId16"/>
+    <p:sldId id="352" r:id="rId13"/>
+    <p:sldId id="335" r:id="rId14"/>
   </p:sldIdLst>
   <p:sldSz cx="12192000" cy="6858000"/>
   <p:notesSz cx="6858000" cy="9144000"/>
@@ -254,7 +252,7 @@
             <a:pPr rtl="0"/>
             <a:fld id="{75725A15-8D86-497D-8EAD-2EB1176C54F6}" type="datetime1">
               <a:rPr lang="es-ES" smtClean="0"/>
-              <a:t>19/10/2024</a:t>
+              <a:t>20/10/2024</a:t>
             </a:fld>
             <a:endParaRPr lang="es-ES"/>
           </a:p>
@@ -334,7 +332,7 @@
             <a:pPr rtl="0"/>
             <a:fld id="{682C0B10-7CAE-41E4-AB02-7E8B1FF2B898}" type="slidenum">
               <a:rPr lang="es-ES" smtClean="0"/>
-              <a:t>‹#›</a:t>
+              <a:t>‹Nº›</a:t>
             </a:fld>
             <a:endParaRPr lang="es-ES"/>
           </a:p>
@@ -436,7 +434,7 @@
             <a:fld id="{B958D509-07EE-4A09-900B-403023880868}" type="datetime1">
               <a:rPr lang="es-ES" smtClean="0"/>
               <a:pPr/>
-              <a:t>19/10/2024</a:t>
+              <a:t>20/10/2024</a:t>
             </a:fld>
             <a:endParaRPr lang="es-ES" dirty="0"/>
           </a:p>
@@ -597,7 +595,7 @@
             <a:pPr rtl="0"/>
             <a:fld id="{8530193B-564F-4854-8A52-728F3FB19C85}" type="slidenum">
               <a:rPr lang="es-ES" noProof="0" smtClean="0"/>
-              <a:t>‹#›</a:t>
+              <a:t>‹Nº›</a:t>
             </a:fld>
             <a:endParaRPr lang="es-ES" noProof="0"/>
           </a:p>
@@ -793,225 +791,6 @@
 </p:notes>
 </file>
 
-<file path=ppt/notesSlides/notesSlide10.xml><?xml version="1.0" encoding="utf-8"?>
-<p:notes xmlns:a="http://schemas.openxmlformats.org/drawingml/2006/main" xmlns:r="http://schemas.openxmlformats.org/officeDocument/2006/relationships" xmlns:p="http://schemas.openxmlformats.org/presentationml/2006/main">
-  <p:cSld>
-    <p:spTree>
-      <p:nvGrpSpPr>
-        <p:cNvPr id="1" name="">
-          <a:extLst>
-            <a:ext uri="{FF2B5EF4-FFF2-40B4-BE49-F238E27FC236}">
-              <a16:creationId xmlns:a16="http://schemas.microsoft.com/office/drawing/2014/main" id="{5DA7D38E-33F9-D49A-4C5B-F7F4AA3A60A3}"/>
-            </a:ext>
-          </a:extLst>
-        </p:cNvPr>
-        <p:cNvGrpSpPr/>
-        <p:nvPr/>
-      </p:nvGrpSpPr>
-      <p:grpSpPr>
-        <a:xfrm>
-          <a:off x="0" y="0"/>
-          <a:ext cx="0" cy="0"/>
-          <a:chOff x="0" y="0"/>
-          <a:chExt cx="0" cy="0"/>
-        </a:xfrm>
-      </p:grpSpPr>
-      <p:sp>
-        <p:nvSpPr>
-          <p:cNvPr id="2" name="Marcador de imagen de diapositiva 1">
-            <a:extLst>
-              <a:ext uri="{FF2B5EF4-FFF2-40B4-BE49-F238E27FC236}">
-                <a16:creationId xmlns:a16="http://schemas.microsoft.com/office/drawing/2014/main" id="{54781FF0-7926-B6A7-820F-74452805D43A}"/>
-              </a:ext>
-            </a:extLst>
-          </p:cNvPr>
-          <p:cNvSpPr>
-            <a:spLocks noGrp="1" noRot="1" noChangeAspect="1"/>
-          </p:cNvSpPr>
-          <p:nvPr>
-            <p:ph type="sldImg"/>
-          </p:nvPr>
-        </p:nvSpPr>
-        <p:spPr/>
-      </p:sp>
-      <p:sp>
-        <p:nvSpPr>
-          <p:cNvPr id="3" name="Marcador de notas 2">
-            <a:extLst>
-              <a:ext uri="{FF2B5EF4-FFF2-40B4-BE49-F238E27FC236}">
-                <a16:creationId xmlns:a16="http://schemas.microsoft.com/office/drawing/2014/main" id="{4CCA55E2-F3E4-D350-3FCD-595B858CB721}"/>
-              </a:ext>
-            </a:extLst>
-          </p:cNvPr>
-          <p:cNvSpPr>
-            <a:spLocks noGrp="1"/>
-          </p:cNvSpPr>
-          <p:nvPr>
-            <p:ph type="body" idx="1"/>
-          </p:nvPr>
-        </p:nvSpPr>
-        <p:spPr/>
-        <p:txBody>
-          <a:bodyPr/>
-          <a:lstStyle/>
-          <a:p>
-            <a:endParaRPr lang="es-ES" dirty="0"/>
-          </a:p>
-        </p:txBody>
-      </p:sp>
-      <p:sp>
-        <p:nvSpPr>
-          <p:cNvPr id="4" name="Marcador de número de diapositiva 3">
-            <a:extLst>
-              <a:ext uri="{FF2B5EF4-FFF2-40B4-BE49-F238E27FC236}">
-                <a16:creationId xmlns:a16="http://schemas.microsoft.com/office/drawing/2014/main" id="{020D89AD-27A1-4AF4-3B31-3F707F5DD491}"/>
-              </a:ext>
-            </a:extLst>
-          </p:cNvPr>
-          <p:cNvSpPr>
-            <a:spLocks noGrp="1"/>
-          </p:cNvSpPr>
-          <p:nvPr>
-            <p:ph type="sldNum" sz="quarter" idx="5"/>
-          </p:nvPr>
-        </p:nvSpPr>
-        <p:spPr/>
-        <p:txBody>
-          <a:bodyPr/>
-          <a:lstStyle/>
-          <a:p>
-            <a:pPr rtl="0"/>
-            <a:fld id="{8530193B-564F-4854-8A52-728F3FB19C85}" type="slidenum">
-              <a:rPr lang="es-ES" noProof="0" smtClean="0"/>
-              <a:t>11</a:t>
-            </a:fld>
-            <a:endParaRPr lang="es-ES" noProof="0"/>
-          </a:p>
-        </p:txBody>
-      </p:sp>
-    </p:spTree>
-    <p:extLst>
-      <p:ext uri="{BB962C8B-B14F-4D97-AF65-F5344CB8AC3E}">
-        <p14:creationId xmlns:p14="http://schemas.microsoft.com/office/powerpoint/2010/main" val="2605541255"/>
-      </p:ext>
-    </p:extLst>
-  </p:cSld>
-  <p:clrMapOvr>
-    <a:masterClrMapping/>
-  </p:clrMapOvr>
-</p:notes>
-</file>
-
-<file path=ppt/notesSlides/notesSlide11.xml><?xml version="1.0" encoding="utf-8"?>
-<p:notes xmlns:a="http://schemas.openxmlformats.org/drawingml/2006/main" xmlns:r="http://schemas.openxmlformats.org/officeDocument/2006/relationships" xmlns:p="http://schemas.openxmlformats.org/presentationml/2006/main">
-  <p:cSld>
-    <p:spTree>
-      <p:nvGrpSpPr>
-        <p:cNvPr id="1" name="">
-          <a:extLst>
-            <a:ext uri="{FF2B5EF4-FFF2-40B4-BE49-F238E27FC236}">
-              <a16:creationId xmlns:a16="http://schemas.microsoft.com/office/drawing/2014/main" id="{B009C85F-EC1B-CFD1-A657-E7902541FA4B}"/>
-            </a:ext>
-          </a:extLst>
-        </p:cNvPr>
-        <p:cNvGrpSpPr/>
-        <p:nvPr/>
-      </p:nvGrpSpPr>
-      <p:grpSpPr>
-        <a:xfrm>
-          <a:off x="0" y="0"/>
-          <a:ext cx="0" cy="0"/>
-          <a:chOff x="0" y="0"/>
-          <a:chExt cx="0" cy="0"/>
-        </a:xfrm>
-      </p:grpSpPr>
-      <p:sp>
-        <p:nvSpPr>
-          <p:cNvPr id="2" name="Marcador de imagen de diapositiva 1">
-            <a:extLst>
-              <a:ext uri="{FF2B5EF4-FFF2-40B4-BE49-F238E27FC236}">
-                <a16:creationId xmlns:a16="http://schemas.microsoft.com/office/drawing/2014/main" id="{1AFF142F-1FC3-8081-0C22-8E98D74940CE}"/>
-              </a:ext>
-            </a:extLst>
-          </p:cNvPr>
-          <p:cNvSpPr>
-            <a:spLocks noGrp="1" noRot="1" noChangeAspect="1"/>
-          </p:cNvSpPr>
-          <p:nvPr>
-            <p:ph type="sldImg"/>
-          </p:nvPr>
-        </p:nvSpPr>
-        <p:spPr/>
-      </p:sp>
-      <p:sp>
-        <p:nvSpPr>
-          <p:cNvPr id="3" name="Marcador de notas 2">
-            <a:extLst>
-              <a:ext uri="{FF2B5EF4-FFF2-40B4-BE49-F238E27FC236}">
-                <a16:creationId xmlns:a16="http://schemas.microsoft.com/office/drawing/2014/main" id="{546EE938-C74C-25D5-628C-C9B03E86980E}"/>
-              </a:ext>
-            </a:extLst>
-          </p:cNvPr>
-          <p:cNvSpPr>
-            <a:spLocks noGrp="1"/>
-          </p:cNvSpPr>
-          <p:nvPr>
-            <p:ph type="body" idx="1"/>
-          </p:nvPr>
-        </p:nvSpPr>
-        <p:spPr/>
-        <p:txBody>
-          <a:bodyPr rtlCol="0"/>
-          <a:lstStyle/>
-          <a:p>
-            <a:pPr rtl="0"/>
-            <a:endParaRPr lang="es-ES"/>
-          </a:p>
-        </p:txBody>
-      </p:sp>
-      <p:sp>
-        <p:nvSpPr>
-          <p:cNvPr id="4" name="Marcador de número de diapositiva 3">
-            <a:extLst>
-              <a:ext uri="{FF2B5EF4-FFF2-40B4-BE49-F238E27FC236}">
-                <a16:creationId xmlns:a16="http://schemas.microsoft.com/office/drawing/2014/main" id="{0A613478-0ACE-0074-01E5-8217CC3C0DB5}"/>
-              </a:ext>
-            </a:extLst>
-          </p:cNvPr>
-          <p:cNvSpPr>
-            <a:spLocks noGrp="1"/>
-          </p:cNvSpPr>
-          <p:nvPr>
-            <p:ph type="sldNum" sz="quarter" idx="5"/>
-          </p:nvPr>
-        </p:nvSpPr>
-        <p:spPr/>
-        <p:txBody>
-          <a:bodyPr rtlCol="0"/>
-          <a:lstStyle/>
-          <a:p>
-            <a:pPr rtl="0"/>
-            <a:fld id="{8530193B-564F-4854-8A52-728F3FB19C85}" type="slidenum">
-              <a:rPr lang="es-ES" smtClean="0"/>
-              <a:t>12</a:t>
-            </a:fld>
-            <a:endParaRPr lang="es-ES"/>
-          </a:p>
-        </p:txBody>
-      </p:sp>
-    </p:spTree>
-    <p:extLst>
-      <p:ext uri="{BB962C8B-B14F-4D97-AF65-F5344CB8AC3E}">
-        <p14:creationId xmlns:p14="http://schemas.microsoft.com/office/powerpoint/2010/main" val="78472006"/>
-      </p:ext>
-    </p:extLst>
-  </p:cSld>
-  <p:clrMapOvr>
-    <a:masterClrMapping/>
-  </p:clrMapOvr>
-</p:notes>
-</file>
-
 <file path=ppt/notesSlides/notesSlide2.xml><?xml version="1.0" encoding="utf-8"?>
 <p:notes xmlns:a="http://schemas.openxmlformats.org/drawingml/2006/main" xmlns:r="http://schemas.openxmlformats.org/officeDocument/2006/relationships" xmlns:p="http://schemas.openxmlformats.org/presentationml/2006/main">
   <p:cSld>
@@ -1624,7 +1403,13 @@
   <p:cSld>
     <p:spTree>
       <p:nvGrpSpPr>
-        <p:cNvPr id="1" name=""/>
+        <p:cNvPr id="1" name="">
+          <a:extLst>
+            <a:ext uri="{FF2B5EF4-FFF2-40B4-BE49-F238E27FC236}">
+              <a16:creationId xmlns:a16="http://schemas.microsoft.com/office/drawing/2014/main" id="{5DA7D38E-33F9-D49A-4C5B-F7F4AA3A60A3}"/>
+            </a:ext>
+          </a:extLst>
+        </p:cNvPr>
         <p:cNvGrpSpPr/>
         <p:nvPr/>
       </p:nvGrpSpPr>
@@ -1638,7 +1423,13 @@
       </p:grpSpPr>
       <p:sp>
         <p:nvSpPr>
-          <p:cNvPr id="2" name="Marcador de imagen de diapositiva 1"/>
+          <p:cNvPr id="2" name="Marcador de imagen de diapositiva 1">
+            <a:extLst>
+              <a:ext uri="{FF2B5EF4-FFF2-40B4-BE49-F238E27FC236}">
+                <a16:creationId xmlns:a16="http://schemas.microsoft.com/office/drawing/2014/main" id="{54781FF0-7926-B6A7-820F-74452805D43A}"/>
+              </a:ext>
+            </a:extLst>
+          </p:cNvPr>
           <p:cNvSpPr>
             <a:spLocks noGrp="1" noRot="1" noChangeAspect="1"/>
           </p:cNvSpPr>
@@ -1650,7 +1441,13 @@
       </p:sp>
       <p:sp>
         <p:nvSpPr>
-          <p:cNvPr id="3" name="Marcador de notas 2"/>
+          <p:cNvPr id="3" name="Marcador de notas 2">
+            <a:extLst>
+              <a:ext uri="{FF2B5EF4-FFF2-40B4-BE49-F238E27FC236}">
+                <a16:creationId xmlns:a16="http://schemas.microsoft.com/office/drawing/2014/main" id="{4CCA55E2-F3E4-D350-3FCD-595B858CB721}"/>
+              </a:ext>
+            </a:extLst>
+          </p:cNvPr>
           <p:cNvSpPr>
             <a:spLocks noGrp="1"/>
           </p:cNvSpPr>
@@ -1669,7 +1466,13 @@
       </p:sp>
       <p:sp>
         <p:nvSpPr>
-          <p:cNvPr id="4" name="Marcador de número de diapositiva 3"/>
+          <p:cNvPr id="4" name="Marcador de número de diapositiva 3">
+            <a:extLst>
+              <a:ext uri="{FF2B5EF4-FFF2-40B4-BE49-F238E27FC236}">
+                <a16:creationId xmlns:a16="http://schemas.microsoft.com/office/drawing/2014/main" id="{020D89AD-27A1-4AF4-3B31-3F707F5DD491}"/>
+              </a:ext>
+            </a:extLst>
+          </p:cNvPr>
           <p:cNvSpPr>
             <a:spLocks noGrp="1"/>
           </p:cNvSpPr>
@@ -1694,7 +1497,7 @@
     </p:spTree>
     <p:extLst>
       <p:ext uri="{BB962C8B-B14F-4D97-AF65-F5344CB8AC3E}">
-        <p14:creationId xmlns:p14="http://schemas.microsoft.com/office/powerpoint/2010/main" val="306567150"/>
+        <p14:creationId xmlns:p14="http://schemas.microsoft.com/office/powerpoint/2010/main" val="2605541255"/>
       </p:ext>
     </p:extLst>
   </p:cSld>
@@ -1712,7 +1515,7 @@
         <p:cNvPr id="1" name="">
           <a:extLst>
             <a:ext uri="{FF2B5EF4-FFF2-40B4-BE49-F238E27FC236}">
-              <a16:creationId xmlns:a16="http://schemas.microsoft.com/office/drawing/2014/main" id="{05DB5F8B-C47F-E364-FF4F-0710957ADB2F}"/>
+              <a16:creationId xmlns:a16="http://schemas.microsoft.com/office/drawing/2014/main" id="{B009C85F-EC1B-CFD1-A657-E7902541FA4B}"/>
             </a:ext>
           </a:extLst>
         </p:cNvPr>
@@ -1732,7 +1535,7 @@
           <p:cNvPr id="2" name="Marcador de imagen de diapositiva 1">
             <a:extLst>
               <a:ext uri="{FF2B5EF4-FFF2-40B4-BE49-F238E27FC236}">
-                <a16:creationId xmlns:a16="http://schemas.microsoft.com/office/drawing/2014/main" id="{B43889D0-0E6B-1C3E-A08A-481B08938A4E}"/>
+                <a16:creationId xmlns:a16="http://schemas.microsoft.com/office/drawing/2014/main" id="{1AFF142F-1FC3-8081-0C22-8E98D74940CE}"/>
               </a:ext>
             </a:extLst>
           </p:cNvPr>
@@ -1750,7 +1553,7 @@
           <p:cNvPr id="3" name="Marcador de notas 2">
             <a:extLst>
               <a:ext uri="{FF2B5EF4-FFF2-40B4-BE49-F238E27FC236}">
-                <a16:creationId xmlns:a16="http://schemas.microsoft.com/office/drawing/2014/main" id="{F62FB440-6DD3-AE5B-8243-49CB15AF8730}"/>
+                <a16:creationId xmlns:a16="http://schemas.microsoft.com/office/drawing/2014/main" id="{546EE938-C74C-25D5-628C-C9B03E86980E}"/>
               </a:ext>
             </a:extLst>
           </p:cNvPr>
@@ -1763,10 +1566,11 @@
         </p:nvSpPr>
         <p:spPr/>
         <p:txBody>
-          <a:bodyPr/>
+          <a:bodyPr rtlCol="0"/>
           <a:lstStyle/>
           <a:p>
-            <a:endParaRPr lang="es-ES" dirty="0"/>
+            <a:pPr rtl="0"/>
+            <a:endParaRPr lang="es-ES"/>
           </a:p>
         </p:txBody>
       </p:sp>
@@ -1775,7 +1579,7 @@
           <p:cNvPr id="4" name="Marcador de número de diapositiva 3">
             <a:extLst>
               <a:ext uri="{FF2B5EF4-FFF2-40B4-BE49-F238E27FC236}">
-                <a16:creationId xmlns:a16="http://schemas.microsoft.com/office/drawing/2014/main" id="{95581750-F2D6-8825-E734-274E3CA2386C}"/>
+                <a16:creationId xmlns:a16="http://schemas.microsoft.com/office/drawing/2014/main" id="{0A613478-0ACE-0074-01E5-8217CC3C0DB5}"/>
               </a:ext>
             </a:extLst>
           </p:cNvPr>
@@ -1788,22 +1592,22 @@
         </p:nvSpPr>
         <p:spPr/>
         <p:txBody>
-          <a:bodyPr/>
+          <a:bodyPr rtlCol="0"/>
           <a:lstStyle/>
           <a:p>
             <a:pPr rtl="0"/>
             <a:fld id="{8530193B-564F-4854-8A52-728F3FB19C85}" type="slidenum">
-              <a:rPr lang="es-ES" noProof="0" smtClean="0"/>
+              <a:rPr lang="es-ES" smtClean="0"/>
               <a:t>10</a:t>
             </a:fld>
-            <a:endParaRPr lang="es-ES" noProof="0"/>
+            <a:endParaRPr lang="es-ES"/>
           </a:p>
         </p:txBody>
       </p:sp>
     </p:spTree>
     <p:extLst>
       <p:ext uri="{BB962C8B-B14F-4D97-AF65-F5344CB8AC3E}">
-        <p14:creationId xmlns:p14="http://schemas.microsoft.com/office/powerpoint/2010/main" val="746271655"/>
+        <p14:creationId xmlns:p14="http://schemas.microsoft.com/office/powerpoint/2010/main" val="78472006"/>
       </p:ext>
     </p:extLst>
   </p:cSld>
@@ -8604,7 +8408,7 @@
                   <a:schemeClr val="accent2"/>
                 </a:solidFill>
               </a:rPr>
-              <a:t>19/10/2024</a:t>
+              <a:t>20/10/2024</a:t>
             </a:fld>
             <a:endParaRPr lang="es-ES" sz="1100" noProof="0" dirty="0">
               <a:solidFill>
@@ -8876,7 +8680,7 @@
                 </a:solidFill>
               </a:rPr>
               <a:pPr algn="r" rtl="0"/>
-              <a:t>‹#›</a:t>
+              <a:t>‹Nº›</a:t>
             </a:fld>
             <a:endParaRPr lang="es-ES" sz="1100" noProof="0">
               <a:solidFill>
@@ -9655,2062 +9459,6 @@
 <file path=ppt/slides/slide10.xml><?xml version="1.0" encoding="utf-8"?>
 <p:sld xmlns:a="http://schemas.openxmlformats.org/drawingml/2006/main" xmlns:r="http://schemas.openxmlformats.org/officeDocument/2006/relationships" xmlns:p="http://schemas.openxmlformats.org/presentationml/2006/main">
   <p:cSld>
-    <p:spTree>
-      <p:nvGrpSpPr>
-        <p:cNvPr id="1" name="">
-          <a:extLst>
-            <a:ext uri="{FF2B5EF4-FFF2-40B4-BE49-F238E27FC236}">
-              <a16:creationId xmlns:a16="http://schemas.microsoft.com/office/drawing/2014/main" id="{2E8AFFAE-1245-19B5-3C60-58AC8A5EA54D}"/>
-            </a:ext>
-          </a:extLst>
-        </p:cNvPr>
-        <p:cNvGrpSpPr/>
-        <p:nvPr/>
-      </p:nvGrpSpPr>
-      <p:grpSpPr>
-        <a:xfrm>
-          <a:off x="0" y="0"/>
-          <a:ext cx="0" cy="0"/>
-          <a:chOff x="0" y="0"/>
-          <a:chExt cx="0" cy="0"/>
-        </a:xfrm>
-      </p:grpSpPr>
-      <p:sp>
-        <p:nvSpPr>
-          <p:cNvPr id="6" name="Rectángulo 5">
-            <a:extLst>
-              <a:ext uri="{FF2B5EF4-FFF2-40B4-BE49-F238E27FC236}">
-                <a16:creationId xmlns:a16="http://schemas.microsoft.com/office/drawing/2014/main" id="{82C12619-B1CF-D3F7-B28B-32652C0F05E3}"/>
-              </a:ext>
-            </a:extLst>
-          </p:cNvPr>
-          <p:cNvSpPr/>
-          <p:nvPr/>
-        </p:nvSpPr>
-        <p:spPr>
-          <a:xfrm>
-            <a:off x="0" y="6400800"/>
-            <a:ext cx="2557670" cy="457200"/>
-          </a:xfrm>
-          <a:prstGeom prst="rect">
-            <a:avLst/>
-          </a:prstGeom>
-          <a:solidFill>
-            <a:schemeClr val="bg1">
-              <a:lumMod val="95000"/>
-            </a:schemeClr>
-          </a:solidFill>
-          <a:ln>
-            <a:noFill/>
-          </a:ln>
-        </p:spPr>
-        <p:style>
-          <a:lnRef idx="2">
-            <a:schemeClr val="accent1">
-              <a:shade val="50000"/>
-            </a:schemeClr>
-          </a:lnRef>
-          <a:fillRef idx="1">
-            <a:schemeClr val="accent1"/>
-          </a:fillRef>
-          <a:effectRef idx="0">
-            <a:schemeClr val="accent1"/>
-          </a:effectRef>
-          <a:fontRef idx="minor">
-            <a:schemeClr val="lt1"/>
-          </a:fontRef>
-        </p:style>
-        <p:txBody>
-          <a:bodyPr rtlCol="0" anchor="ctr"/>
-          <a:lstStyle/>
-          <a:p>
-            <a:pPr algn="ctr"/>
-            <a:endParaRPr lang="es-ES"/>
-          </a:p>
-        </p:txBody>
-      </p:sp>
-      <p:sp>
-        <p:nvSpPr>
-          <p:cNvPr id="4" name="Rectángulo: esquinas redondeadas 3">
-            <a:extLst>
-              <a:ext uri="{FF2B5EF4-FFF2-40B4-BE49-F238E27FC236}">
-                <a16:creationId xmlns:a16="http://schemas.microsoft.com/office/drawing/2014/main" id="{0EF04D99-B7F8-3573-2F18-E88215F913F3}"/>
-              </a:ext>
-            </a:extLst>
-          </p:cNvPr>
-          <p:cNvSpPr/>
-          <p:nvPr/>
-        </p:nvSpPr>
-        <p:spPr>
-          <a:xfrm>
-            <a:off x="505958" y="1104371"/>
-            <a:ext cx="5508000" cy="5324706"/>
-          </a:xfrm>
-          <a:prstGeom prst="roundRect">
-            <a:avLst>
-              <a:gd name="adj" fmla="val 7845"/>
-            </a:avLst>
-          </a:prstGeom>
-          <a:solidFill>
-            <a:schemeClr val="bg1"/>
-          </a:solidFill>
-          <a:ln>
-            <a:noFill/>
-          </a:ln>
-        </p:spPr>
-        <p:style>
-          <a:lnRef idx="2">
-            <a:schemeClr val="accent1">
-              <a:shade val="50000"/>
-            </a:schemeClr>
-          </a:lnRef>
-          <a:fillRef idx="1">
-            <a:schemeClr val="accent1"/>
-          </a:fillRef>
-          <a:effectRef idx="0">
-            <a:schemeClr val="accent1"/>
-          </a:effectRef>
-          <a:fontRef idx="minor">
-            <a:schemeClr val="lt1"/>
-          </a:fontRef>
-        </p:style>
-        <p:txBody>
-          <a:bodyPr rtlCol="0" anchor="ctr"/>
-          <a:lstStyle/>
-          <a:p>
-            <a:pPr algn="ctr"/>
-            <a:endParaRPr lang="es-ES"/>
-          </a:p>
-        </p:txBody>
-      </p:sp>
-      <p:sp>
-        <p:nvSpPr>
-          <p:cNvPr id="5" name="QuadreDeText 3">
-            <a:extLst>
-              <a:ext uri="{FF2B5EF4-FFF2-40B4-BE49-F238E27FC236}">
-                <a16:creationId xmlns:a16="http://schemas.microsoft.com/office/drawing/2014/main" id="{8D4C57D9-90FA-1254-9EC5-207A0AEE2D7F}"/>
-              </a:ext>
-            </a:extLst>
-          </p:cNvPr>
-          <p:cNvSpPr txBox="1"/>
-          <p:nvPr/>
-        </p:nvSpPr>
-        <p:spPr>
-          <a:xfrm>
-            <a:off x="505958" y="250347"/>
-            <a:ext cx="11230211" cy="923330"/>
-          </a:xfrm>
-          <a:prstGeom prst="rect">
-            <a:avLst/>
-          </a:prstGeom>
-          <a:noFill/>
-        </p:spPr>
-        <p:txBody>
-          <a:bodyPr wrap="square">
-            <a:spAutoFit/>
-          </a:bodyPr>
-          <a:lstStyle/>
-          <a:p>
-            <a:r>
-              <a:rPr lang="es-ES" sz="2400" b="1" dirty="0">
-                <a:solidFill>
-                  <a:schemeClr val="accent3">
-                    <a:lumMod val="50000"/>
-                  </a:schemeClr>
-                </a:solidFill>
-                <a:effectLst/>
-                <a:latin typeface="+mj-lt"/>
-              </a:rPr>
-              <a:t>PROPUESTAS DE AJUSTES DE GESTIÓN DE RIESGOS</a:t>
-            </a:r>
-          </a:p>
-          <a:p>
-            <a:r>
-              <a:rPr lang="es-ES" altLang="es-ES" sz="1400" b="1" dirty="0"/>
-              <a:t>¿Cómo deberíamos ajustar nuestras ofertas y estrategias de gestión de riesgos en función de estos hallazgos? </a:t>
-            </a:r>
-          </a:p>
-          <a:p>
-            <a:endParaRPr lang="es-ES" sz="1400" b="1" dirty="0"/>
-          </a:p>
-        </p:txBody>
-      </p:sp>
-      <p:sp>
-        <p:nvSpPr>
-          <p:cNvPr id="12" name="QuadreDeText 4">
-            <a:extLst>
-              <a:ext uri="{FF2B5EF4-FFF2-40B4-BE49-F238E27FC236}">
-                <a16:creationId xmlns:a16="http://schemas.microsoft.com/office/drawing/2014/main" id="{F8DAB84A-1803-6DAD-0E57-B92FF80BE70E}"/>
-              </a:ext>
-            </a:extLst>
-          </p:cNvPr>
-          <p:cNvSpPr txBox="1"/>
-          <p:nvPr/>
-        </p:nvSpPr>
-        <p:spPr>
-          <a:xfrm>
-            <a:off x="642280" y="1237507"/>
-            <a:ext cx="5041470" cy="646331"/>
-          </a:xfrm>
-          <a:prstGeom prst="rect">
-            <a:avLst/>
-          </a:prstGeom>
-          <a:noFill/>
-        </p:spPr>
-        <p:txBody>
-          <a:bodyPr wrap="square" rtlCol="0">
-            <a:spAutoFit/>
-          </a:bodyPr>
-          <a:lstStyle/>
-          <a:p>
-            <a:r>
-              <a:rPr lang="es-ES" altLang="es-ES" sz="1200" dirty="0"/>
-              <a:t>Los clientes con </a:t>
-            </a:r>
-            <a:r>
-              <a:rPr lang="es-ES" altLang="es-ES" sz="1200" b="1" dirty="0"/>
-              <a:t>préstamos</a:t>
-            </a:r>
-            <a:r>
-              <a:rPr lang="es-ES" altLang="es-ES" sz="1200" dirty="0"/>
-              <a:t>:</a:t>
-            </a:r>
-          </a:p>
-          <a:p>
-            <a:r>
-              <a:rPr lang="es-ES" altLang="es-ES" sz="1200" i="1" dirty="0">
-                <a:solidFill>
-                  <a:srgbClr val="FF0000"/>
-                </a:solidFill>
-              </a:rPr>
-              <a:t>Tienden a tener mucho menor saldo</a:t>
-            </a:r>
-          </a:p>
-          <a:p>
-            <a:r>
-              <a:rPr lang="es-ES" altLang="es-ES" sz="1200" i="1" dirty="0">
-                <a:solidFill>
-                  <a:srgbClr val="FF0000"/>
-                </a:solidFill>
-              </a:rPr>
-              <a:t>Tienden a tener mucho más riesgo de incumplimiento</a:t>
-            </a:r>
-          </a:p>
-        </p:txBody>
-      </p:sp>
-      <p:sp>
-        <p:nvSpPr>
-          <p:cNvPr id="20" name="CuadroTexto 19">
-            <a:extLst>
-              <a:ext uri="{FF2B5EF4-FFF2-40B4-BE49-F238E27FC236}">
-                <a16:creationId xmlns:a16="http://schemas.microsoft.com/office/drawing/2014/main" id="{896210D7-3C0F-3AC0-DC70-37297C05C01C}"/>
-              </a:ext>
-            </a:extLst>
-          </p:cNvPr>
-          <p:cNvSpPr txBox="1"/>
-          <p:nvPr/>
-        </p:nvSpPr>
-        <p:spPr>
-          <a:xfrm>
-            <a:off x="1977738" y="2283417"/>
-            <a:ext cx="3874361" cy="1208842"/>
-          </a:xfrm>
-          <a:prstGeom prst="roundRect">
-            <a:avLst/>
-          </a:prstGeom>
-          <a:noFill/>
-          <a:ln w="19050">
-            <a:solidFill>
-              <a:srgbClr val="FF8181"/>
-            </a:solidFill>
-            <a:prstDash val="sysDash"/>
-          </a:ln>
-        </p:spPr>
-        <p:txBody>
-          <a:bodyPr wrap="square">
-            <a:spAutoFit/>
-          </a:bodyPr>
-          <a:lstStyle/>
-          <a:p>
-            <a:pPr marL="171450" indent="-171450" algn="just">
-              <a:spcBef>
-                <a:spcPts val="300"/>
-              </a:spcBef>
-              <a:buFont typeface="Arial" panose="020B0604020202020204" pitchFamily="34" charset="0"/>
-              <a:buChar char="•"/>
-            </a:pPr>
-            <a:r>
-              <a:rPr lang="es-ES" sz="1200" dirty="0"/>
-              <a:t>Se piden más préstamos por necesidad que para artículos de lujo o para emprender.</a:t>
-            </a:r>
-          </a:p>
-          <a:p>
-            <a:pPr marL="171450" indent="-171450" algn="just">
-              <a:spcBef>
-                <a:spcPts val="300"/>
-              </a:spcBef>
-              <a:buFont typeface="Arial" panose="020B0604020202020204" pitchFamily="34" charset="0"/>
-              <a:buChar char="•"/>
-            </a:pPr>
-            <a:endParaRPr lang="es-ES" sz="1200" dirty="0"/>
-          </a:p>
-          <a:p>
-            <a:pPr marL="171450" indent="-171450" algn="just">
-              <a:spcBef>
-                <a:spcPts val="300"/>
-              </a:spcBef>
-              <a:buFont typeface="Arial" panose="020B0604020202020204" pitchFamily="34" charset="0"/>
-              <a:buChar char="•"/>
-            </a:pPr>
-            <a:r>
-              <a:rPr lang="es-ES" sz="1200" dirty="0"/>
-              <a:t>Su flujo de efectivo es más frágil; al no tener mayor saldo, pueden incumplir con facilidad.</a:t>
-            </a:r>
-          </a:p>
-        </p:txBody>
-      </p:sp>
-      <p:sp>
-        <p:nvSpPr>
-          <p:cNvPr id="30" name="CuadroTexto 29">
-            <a:extLst>
-              <a:ext uri="{FF2B5EF4-FFF2-40B4-BE49-F238E27FC236}">
-                <a16:creationId xmlns:a16="http://schemas.microsoft.com/office/drawing/2014/main" id="{6B0A3DF6-5B8C-C82E-4007-09D066866A92}"/>
-              </a:ext>
-            </a:extLst>
-          </p:cNvPr>
-          <p:cNvSpPr txBox="1"/>
-          <p:nvPr/>
-        </p:nvSpPr>
-        <p:spPr>
-          <a:xfrm>
-            <a:off x="1939561" y="4615144"/>
-            <a:ext cx="3874360" cy="1413153"/>
-          </a:xfrm>
-          <a:prstGeom prst="roundRect">
-            <a:avLst/>
-          </a:prstGeom>
-          <a:noFill/>
-          <a:ln w="19050">
-            <a:solidFill>
-              <a:srgbClr val="92D050"/>
-            </a:solidFill>
-            <a:prstDash val="sysDash"/>
-          </a:ln>
-        </p:spPr>
-        <p:txBody>
-          <a:bodyPr wrap="square">
-            <a:spAutoFit/>
-          </a:bodyPr>
-          <a:lstStyle/>
-          <a:p>
-            <a:pPr marL="171450" indent="-171450" algn="just">
-              <a:spcBef>
-                <a:spcPts val="300"/>
-              </a:spcBef>
-              <a:buFont typeface="Arial" panose="020B0604020202020204" pitchFamily="34" charset="0"/>
-              <a:buChar char="•"/>
-            </a:pPr>
-            <a:r>
-              <a:rPr lang="es-ES" sz="1200" dirty="0"/>
-              <a:t>Incentivar los préstamos para coches, etc. entre los que tienen mayor saldo con intereses menores.</a:t>
-            </a:r>
-          </a:p>
-          <a:p>
-            <a:pPr marL="171450" indent="-171450" algn="just">
-              <a:spcBef>
-                <a:spcPts val="300"/>
-              </a:spcBef>
-              <a:buFont typeface="Arial" panose="020B0604020202020204" pitchFamily="34" charset="0"/>
-              <a:buChar char="•"/>
-            </a:pPr>
-            <a:endParaRPr lang="es-ES" sz="1200" dirty="0"/>
-          </a:p>
-          <a:p>
-            <a:pPr marL="171450" indent="-171450" algn="just">
-              <a:spcBef>
-                <a:spcPts val="300"/>
-              </a:spcBef>
-              <a:buFont typeface="Arial" panose="020B0604020202020204" pitchFamily="34" charset="0"/>
-              <a:buChar char="•"/>
-            </a:pPr>
-            <a:r>
-              <a:rPr lang="es-ES" sz="1200" dirty="0"/>
-              <a:t>Revisar las condiciones de acceso a los préstamos:  Revisar el histórico de saldo del cliente y darle más o menos préstamo en función de eso.</a:t>
-            </a:r>
-          </a:p>
-        </p:txBody>
-      </p:sp>
-      <p:sp>
-        <p:nvSpPr>
-          <p:cNvPr id="31" name="Rectángulo: esquinas redondeadas 30">
-            <a:extLst>
-              <a:ext uri="{FF2B5EF4-FFF2-40B4-BE49-F238E27FC236}">
-                <a16:creationId xmlns:a16="http://schemas.microsoft.com/office/drawing/2014/main" id="{2A86DF7C-2112-699E-12B5-9B66B3CC713C}"/>
-              </a:ext>
-            </a:extLst>
-          </p:cNvPr>
-          <p:cNvSpPr/>
-          <p:nvPr/>
-        </p:nvSpPr>
-        <p:spPr>
-          <a:xfrm>
-            <a:off x="6228170" y="1104371"/>
-            <a:ext cx="5508000" cy="5324706"/>
-          </a:xfrm>
-          <a:prstGeom prst="roundRect">
-            <a:avLst>
-              <a:gd name="adj" fmla="val 7845"/>
-            </a:avLst>
-          </a:prstGeom>
-          <a:solidFill>
-            <a:schemeClr val="bg1"/>
-          </a:solidFill>
-          <a:ln>
-            <a:noFill/>
-          </a:ln>
-        </p:spPr>
-        <p:style>
-          <a:lnRef idx="2">
-            <a:schemeClr val="accent1">
-              <a:shade val="50000"/>
-            </a:schemeClr>
-          </a:lnRef>
-          <a:fillRef idx="1">
-            <a:schemeClr val="accent1"/>
-          </a:fillRef>
-          <a:effectRef idx="0">
-            <a:schemeClr val="accent1"/>
-          </a:effectRef>
-          <a:fontRef idx="minor">
-            <a:schemeClr val="lt1"/>
-          </a:fontRef>
-        </p:style>
-        <p:txBody>
-          <a:bodyPr rtlCol="0" anchor="ctr"/>
-          <a:lstStyle/>
-          <a:p>
-            <a:pPr algn="ctr"/>
-            <a:endParaRPr lang="es-ES"/>
-          </a:p>
-        </p:txBody>
-      </p:sp>
-      <p:sp>
-        <p:nvSpPr>
-          <p:cNvPr id="34" name="QuadreDeText 4">
-            <a:extLst>
-              <a:ext uri="{FF2B5EF4-FFF2-40B4-BE49-F238E27FC236}">
-                <a16:creationId xmlns:a16="http://schemas.microsoft.com/office/drawing/2014/main" id="{9874C9EE-0936-735C-C6CA-805DA41B69D7}"/>
-              </a:ext>
-            </a:extLst>
-          </p:cNvPr>
-          <p:cNvSpPr txBox="1"/>
-          <p:nvPr/>
-        </p:nvSpPr>
-        <p:spPr>
-          <a:xfrm>
-            <a:off x="6539829" y="1237507"/>
-            <a:ext cx="5041470" cy="1015663"/>
-          </a:xfrm>
-          <a:prstGeom prst="rect">
-            <a:avLst/>
-          </a:prstGeom>
-          <a:noFill/>
-        </p:spPr>
-        <p:txBody>
-          <a:bodyPr wrap="square" rtlCol="0">
-            <a:spAutoFit/>
-          </a:bodyPr>
-          <a:lstStyle/>
-          <a:p>
-            <a:r>
-              <a:rPr lang="es-ES" altLang="es-ES" sz="1200" dirty="0"/>
-              <a:t>Los clientes con </a:t>
-            </a:r>
-            <a:r>
-              <a:rPr lang="es-ES" altLang="es-ES" sz="1200" b="1" dirty="0"/>
-              <a:t>hipotecas</a:t>
-            </a:r>
-            <a:r>
-              <a:rPr lang="es-ES" altLang="es-ES" sz="1200" dirty="0"/>
-              <a:t>: </a:t>
-            </a:r>
-          </a:p>
-          <a:p>
-            <a:r>
-              <a:rPr lang="es-ES" altLang="es-ES" sz="1200" i="1" dirty="0">
-                <a:solidFill>
-                  <a:srgbClr val="FF0000"/>
-                </a:solidFill>
-              </a:rPr>
-              <a:t>Tienden a tener un saldo un poco menor</a:t>
-            </a:r>
-          </a:p>
-          <a:p>
-            <a:r>
-              <a:rPr lang="es-ES" altLang="es-ES" sz="1200" i="1" dirty="0">
-                <a:solidFill>
-                  <a:srgbClr val="FF0000"/>
-                </a:solidFill>
-              </a:rPr>
-              <a:t>Tienden a tener un poco más de riesgo en los que no tienen préstamo</a:t>
-            </a:r>
-          </a:p>
-          <a:p>
-            <a:r>
-              <a:rPr lang="es-ES" altLang="es-ES" sz="1200" i="1" dirty="0">
-                <a:solidFill>
-                  <a:srgbClr val="FF0000"/>
-                </a:solidFill>
-              </a:rPr>
-              <a:t>Tienden a tener menor riesgo en los que tienen también préstamo</a:t>
-            </a:r>
-          </a:p>
-          <a:p>
-            <a:endParaRPr lang="es-ES" sz="1200" dirty="0"/>
-          </a:p>
-        </p:txBody>
-      </p:sp>
-      <p:sp>
-        <p:nvSpPr>
-          <p:cNvPr id="36" name="CuadroTexto 35">
-            <a:extLst>
-              <a:ext uri="{FF2B5EF4-FFF2-40B4-BE49-F238E27FC236}">
-                <a16:creationId xmlns:a16="http://schemas.microsoft.com/office/drawing/2014/main" id="{33B35FA5-2039-2EB9-8968-020B51A4D1FB}"/>
-              </a:ext>
-            </a:extLst>
-          </p:cNvPr>
-          <p:cNvSpPr txBox="1"/>
-          <p:nvPr/>
-        </p:nvSpPr>
-        <p:spPr>
-          <a:xfrm>
-            <a:off x="7696039" y="2364290"/>
-            <a:ext cx="3873600" cy="1736646"/>
-          </a:xfrm>
-          <a:prstGeom prst="roundRect">
-            <a:avLst/>
-          </a:prstGeom>
-          <a:noFill/>
-          <a:ln w="19050">
-            <a:solidFill>
-              <a:srgbClr val="FF8181"/>
-            </a:solidFill>
-            <a:prstDash val="sysDash"/>
-          </a:ln>
-        </p:spPr>
-        <p:txBody>
-          <a:bodyPr wrap="square">
-            <a:spAutoFit/>
-          </a:bodyPr>
-          <a:lstStyle>
-            <a:defPPr rtl="0">
-              <a:defRPr lang="es-es"/>
-            </a:defPPr>
-            <a:lvl1pPr algn="just">
-              <a:spcBef>
-                <a:spcPts val="300"/>
-              </a:spcBef>
-              <a:defRPr sz="1200" b="1"/>
-            </a:lvl1pPr>
-          </a:lstStyle>
-          <a:p>
-            <a:pPr marL="171450" indent="-171450">
-              <a:spcBef>
-                <a:spcPts val="0"/>
-              </a:spcBef>
-              <a:buFont typeface="Arial" panose="020B0604020202020204" pitchFamily="34" charset="0"/>
-              <a:buChar char="•"/>
-            </a:pPr>
-            <a:r>
-              <a:rPr lang="es-ES" b="0" dirty="0"/>
-              <a:t>Los clientes con hipotecas destinan gran parte de sus ingresos a éstas y, por ello, su saldo es menor y tienen mayor peligro de incumplimiento.</a:t>
-            </a:r>
-          </a:p>
-          <a:p>
-            <a:pPr marL="171450" indent="-171450">
-              <a:spcBef>
-                <a:spcPts val="0"/>
-              </a:spcBef>
-              <a:buFont typeface="Arial" panose="020B0604020202020204" pitchFamily="34" charset="0"/>
-              <a:buChar char="•"/>
-            </a:pPr>
-            <a:endParaRPr lang="es-ES" b="0" dirty="0"/>
-          </a:p>
-          <a:p>
-            <a:pPr marL="171450" indent="-171450">
-              <a:spcBef>
-                <a:spcPts val="0"/>
-              </a:spcBef>
-              <a:buFont typeface="Arial" panose="020B0604020202020204" pitchFamily="34" charset="0"/>
-              <a:buChar char="•"/>
-            </a:pPr>
-            <a:endParaRPr lang="es-ES" b="0" dirty="0"/>
-          </a:p>
-          <a:p>
-            <a:pPr marL="171450" indent="-171450">
-              <a:spcBef>
-                <a:spcPts val="0"/>
-              </a:spcBef>
-              <a:buFont typeface="Arial" panose="020B0604020202020204" pitchFamily="34" charset="0"/>
-              <a:buChar char="•"/>
-            </a:pPr>
-            <a:r>
-              <a:rPr lang="es-ES" b="0" dirty="0"/>
-              <a:t>Los que también tienen préstamo puede que lo hayan pedido para reformar la casa y eso sea una señal de que tienen más ingresos.</a:t>
-            </a:r>
-          </a:p>
-        </p:txBody>
-      </p:sp>
-      <p:sp>
-        <p:nvSpPr>
-          <p:cNvPr id="38" name="CuadroTexto 37">
-            <a:extLst>
-              <a:ext uri="{FF2B5EF4-FFF2-40B4-BE49-F238E27FC236}">
-                <a16:creationId xmlns:a16="http://schemas.microsoft.com/office/drawing/2014/main" id="{51C5112F-8DED-1D76-83A1-4C093E8C564D}"/>
-              </a:ext>
-            </a:extLst>
-          </p:cNvPr>
-          <p:cNvSpPr txBox="1"/>
-          <p:nvPr/>
-        </p:nvSpPr>
-        <p:spPr>
-          <a:xfrm>
-            <a:off x="7696039" y="4555553"/>
-            <a:ext cx="3873600" cy="1532334"/>
-          </a:xfrm>
-          <a:prstGeom prst="roundRect">
-            <a:avLst/>
-          </a:prstGeom>
-          <a:noFill/>
-          <a:ln w="19050">
-            <a:solidFill>
-              <a:srgbClr val="92D050"/>
-            </a:solidFill>
-            <a:prstDash val="sysDash"/>
-          </a:ln>
-        </p:spPr>
-        <p:txBody>
-          <a:bodyPr wrap="square">
-            <a:spAutoFit/>
-          </a:bodyPr>
-          <a:lstStyle>
-            <a:defPPr rtl="0">
-              <a:defRPr lang="es-es"/>
-            </a:defPPr>
-            <a:lvl1pPr algn="just">
-              <a:spcBef>
-                <a:spcPts val="300"/>
-              </a:spcBef>
-              <a:defRPr sz="1200" b="1"/>
-            </a:lvl1pPr>
-          </a:lstStyle>
-          <a:p>
-            <a:pPr marL="171450" indent="-171450">
-              <a:spcBef>
-                <a:spcPts val="0"/>
-              </a:spcBef>
-              <a:buFont typeface="Arial" panose="020B0604020202020204" pitchFamily="34" charset="0"/>
-              <a:buChar char="•"/>
-            </a:pPr>
-            <a:r>
-              <a:rPr lang="es-ES" b="0" dirty="0"/>
-              <a:t>Ajustar las condiciones de las hipotecas a los ingresos reales de los clientes.</a:t>
-            </a:r>
-          </a:p>
-          <a:p>
-            <a:pPr marL="171450" indent="-171450">
-              <a:spcBef>
-                <a:spcPts val="0"/>
-              </a:spcBef>
-              <a:buFont typeface="Arial" panose="020B0604020202020204" pitchFamily="34" charset="0"/>
-              <a:buChar char="•"/>
-            </a:pPr>
-            <a:endParaRPr lang="es-ES" b="0" dirty="0"/>
-          </a:p>
-          <a:p>
-            <a:pPr marL="171450" indent="-171450">
-              <a:spcBef>
-                <a:spcPts val="0"/>
-              </a:spcBef>
-              <a:buFont typeface="Arial" panose="020B0604020202020204" pitchFamily="34" charset="0"/>
-              <a:buChar char="•"/>
-            </a:pPr>
-            <a:r>
-              <a:rPr lang="es-ES" b="0" dirty="0"/>
-              <a:t>Poder suavizar las condiciones puntualmente en caso de necesidad para que no caigan en impago: Congelar el pago de intereses y así bajar las cuotas por un determinado tiempo o alargar el periodo de pago.</a:t>
-            </a:r>
-          </a:p>
-        </p:txBody>
-      </p:sp>
-      <p:sp>
-        <p:nvSpPr>
-          <p:cNvPr id="41" name="Elipse 40">
-            <a:extLst>
-              <a:ext uri="{FF2B5EF4-FFF2-40B4-BE49-F238E27FC236}">
-                <a16:creationId xmlns:a16="http://schemas.microsoft.com/office/drawing/2014/main" id="{EBE1CA10-386B-7E6C-C1AF-CBC1915E84EE}"/>
-              </a:ext>
-            </a:extLst>
-          </p:cNvPr>
-          <p:cNvSpPr/>
-          <p:nvPr/>
-        </p:nvSpPr>
-        <p:spPr>
-          <a:xfrm>
-            <a:off x="6391631" y="2646748"/>
-            <a:ext cx="1173600" cy="1171731"/>
-          </a:xfrm>
-          <a:prstGeom prst="ellipse">
-            <a:avLst/>
-          </a:prstGeom>
-          <a:solidFill>
-            <a:srgbClr val="FFB7B7"/>
-          </a:solidFill>
-          <a:ln>
-            <a:solidFill>
-              <a:srgbClr val="FF8181"/>
-            </a:solidFill>
-          </a:ln>
-        </p:spPr>
-        <p:style>
-          <a:lnRef idx="2">
-            <a:schemeClr val="accent1">
-              <a:shade val="50000"/>
-            </a:schemeClr>
-          </a:lnRef>
-          <a:fillRef idx="1">
-            <a:schemeClr val="accent1"/>
-          </a:fillRef>
-          <a:effectRef idx="0">
-            <a:schemeClr val="accent1"/>
-          </a:effectRef>
-          <a:fontRef idx="minor">
-            <a:schemeClr val="lt1"/>
-          </a:fontRef>
-        </p:style>
-        <p:txBody>
-          <a:bodyPr rtlCol="0" anchor="ctr"/>
-          <a:lstStyle/>
-          <a:p>
-            <a:pPr algn="ctr"/>
-            <a:r>
-              <a:rPr lang="es-ES" sz="1400" dirty="0">
-                <a:solidFill>
-                  <a:schemeClr val="tx1"/>
-                </a:solidFill>
-              </a:rPr>
-              <a:t>Posibles </a:t>
-            </a:r>
-            <a:r>
-              <a:rPr lang="es-ES" sz="1400" b="1" dirty="0">
-                <a:solidFill>
-                  <a:schemeClr val="tx1"/>
-                </a:solidFill>
-              </a:rPr>
-              <a:t>CAUSAS</a:t>
-            </a:r>
-          </a:p>
-        </p:txBody>
-      </p:sp>
-      <p:sp>
-        <p:nvSpPr>
-          <p:cNvPr id="42" name="Elipse 41">
-            <a:extLst>
-              <a:ext uri="{FF2B5EF4-FFF2-40B4-BE49-F238E27FC236}">
-                <a16:creationId xmlns:a16="http://schemas.microsoft.com/office/drawing/2014/main" id="{807290C0-F38E-C165-76F9-7D9A5C71E072}"/>
-              </a:ext>
-            </a:extLst>
-          </p:cNvPr>
-          <p:cNvSpPr/>
-          <p:nvPr/>
-        </p:nvSpPr>
-        <p:spPr>
-          <a:xfrm>
-            <a:off x="6371770" y="4735858"/>
-            <a:ext cx="1173600" cy="1171731"/>
-          </a:xfrm>
-          <a:prstGeom prst="ellipse">
-            <a:avLst/>
-          </a:prstGeom>
-          <a:solidFill>
-            <a:srgbClr val="D2ECB6"/>
-          </a:solidFill>
-          <a:ln>
-            <a:solidFill>
-              <a:srgbClr val="92D050"/>
-            </a:solidFill>
-          </a:ln>
-        </p:spPr>
-        <p:style>
-          <a:lnRef idx="2">
-            <a:schemeClr val="accent1">
-              <a:shade val="50000"/>
-            </a:schemeClr>
-          </a:lnRef>
-          <a:fillRef idx="1">
-            <a:schemeClr val="accent1"/>
-          </a:fillRef>
-          <a:effectRef idx="0">
-            <a:schemeClr val="accent1"/>
-          </a:effectRef>
-          <a:fontRef idx="minor">
-            <a:schemeClr val="lt1"/>
-          </a:fontRef>
-        </p:style>
-        <p:txBody>
-          <a:bodyPr rtlCol="0" anchor="ctr"/>
-          <a:lstStyle/>
-          <a:p>
-            <a:pPr algn="ctr"/>
-            <a:r>
-              <a:rPr lang="es-ES" sz="1400" b="1" dirty="0">
-                <a:solidFill>
-                  <a:schemeClr val="tx1"/>
-                </a:solidFill>
-              </a:rPr>
-              <a:t>RECO-MENDA-CIONES</a:t>
-            </a:r>
-          </a:p>
-        </p:txBody>
-      </p:sp>
-      <p:sp>
-        <p:nvSpPr>
-          <p:cNvPr id="43" name="Elipse 42">
-            <a:extLst>
-              <a:ext uri="{FF2B5EF4-FFF2-40B4-BE49-F238E27FC236}">
-                <a16:creationId xmlns:a16="http://schemas.microsoft.com/office/drawing/2014/main" id="{CEE29C46-E71A-57CD-0B9E-5BD8FA295929}"/>
-              </a:ext>
-            </a:extLst>
-          </p:cNvPr>
-          <p:cNvSpPr/>
-          <p:nvPr/>
-        </p:nvSpPr>
-        <p:spPr>
-          <a:xfrm>
-            <a:off x="622361" y="4735856"/>
-            <a:ext cx="1173600" cy="1171731"/>
-          </a:xfrm>
-          <a:prstGeom prst="ellipse">
-            <a:avLst/>
-          </a:prstGeom>
-          <a:solidFill>
-            <a:srgbClr val="D2ECB6"/>
-          </a:solidFill>
-          <a:ln>
-            <a:solidFill>
-              <a:srgbClr val="92D050"/>
-            </a:solidFill>
-          </a:ln>
-        </p:spPr>
-        <p:style>
-          <a:lnRef idx="2">
-            <a:schemeClr val="accent1">
-              <a:shade val="50000"/>
-            </a:schemeClr>
-          </a:lnRef>
-          <a:fillRef idx="1">
-            <a:schemeClr val="accent1"/>
-          </a:fillRef>
-          <a:effectRef idx="0">
-            <a:schemeClr val="accent1"/>
-          </a:effectRef>
-          <a:fontRef idx="minor">
-            <a:schemeClr val="lt1"/>
-          </a:fontRef>
-        </p:style>
-        <p:txBody>
-          <a:bodyPr rtlCol="0" anchor="ctr"/>
-          <a:lstStyle/>
-          <a:p>
-            <a:pPr algn="ctr"/>
-            <a:r>
-              <a:rPr lang="es-ES" sz="1400" b="1" dirty="0">
-                <a:solidFill>
-                  <a:schemeClr val="tx1"/>
-                </a:solidFill>
-              </a:rPr>
-              <a:t>RECO-MENDA-CIONES</a:t>
-            </a:r>
-          </a:p>
-        </p:txBody>
-      </p:sp>
-      <p:sp>
-        <p:nvSpPr>
-          <p:cNvPr id="44" name="Elipse 43">
-            <a:extLst>
-              <a:ext uri="{FF2B5EF4-FFF2-40B4-BE49-F238E27FC236}">
-                <a16:creationId xmlns:a16="http://schemas.microsoft.com/office/drawing/2014/main" id="{ECC5AFA2-2A78-BE0F-028B-542C5F713CFD}"/>
-              </a:ext>
-            </a:extLst>
-          </p:cNvPr>
-          <p:cNvSpPr/>
-          <p:nvPr/>
-        </p:nvSpPr>
-        <p:spPr>
-          <a:xfrm>
-            <a:off x="642280" y="2301973"/>
-            <a:ext cx="1173600" cy="1171731"/>
-          </a:xfrm>
-          <a:prstGeom prst="ellipse">
-            <a:avLst/>
-          </a:prstGeom>
-          <a:solidFill>
-            <a:srgbClr val="FFB7B7"/>
-          </a:solidFill>
-          <a:ln>
-            <a:solidFill>
-              <a:srgbClr val="FF8181"/>
-            </a:solidFill>
-          </a:ln>
-        </p:spPr>
-        <p:style>
-          <a:lnRef idx="2">
-            <a:schemeClr val="accent1">
-              <a:shade val="50000"/>
-            </a:schemeClr>
-          </a:lnRef>
-          <a:fillRef idx="1">
-            <a:schemeClr val="accent1"/>
-          </a:fillRef>
-          <a:effectRef idx="0">
-            <a:schemeClr val="accent1"/>
-          </a:effectRef>
-          <a:fontRef idx="minor">
-            <a:schemeClr val="lt1"/>
-          </a:fontRef>
-        </p:style>
-        <p:txBody>
-          <a:bodyPr rtlCol="0" anchor="ctr"/>
-          <a:lstStyle/>
-          <a:p>
-            <a:pPr algn="ctr"/>
-            <a:r>
-              <a:rPr lang="es-ES" sz="1400" dirty="0">
-                <a:solidFill>
-                  <a:schemeClr val="tx1"/>
-                </a:solidFill>
-              </a:rPr>
-              <a:t>Posibles </a:t>
-            </a:r>
-            <a:r>
-              <a:rPr lang="es-ES" sz="1400" b="1" dirty="0">
-                <a:solidFill>
-                  <a:schemeClr val="tx1"/>
-                </a:solidFill>
-              </a:rPr>
-              <a:t>CAUSAS</a:t>
-            </a:r>
-          </a:p>
-        </p:txBody>
-      </p:sp>
-    </p:spTree>
-    <p:extLst>
-      <p:ext uri="{BB962C8B-B14F-4D97-AF65-F5344CB8AC3E}">
-        <p14:creationId xmlns:p14="http://schemas.microsoft.com/office/powerpoint/2010/main" val="1135837949"/>
-      </p:ext>
-    </p:extLst>
-  </p:cSld>
-  <p:clrMapOvr>
-    <a:masterClrMapping/>
-  </p:clrMapOvr>
-</p:sld>
-</file>
-
-<file path=ppt/slides/slide11.xml><?xml version="1.0" encoding="utf-8"?>
-<p:sld xmlns:a="http://schemas.openxmlformats.org/drawingml/2006/main" xmlns:r="http://schemas.openxmlformats.org/officeDocument/2006/relationships" xmlns:p="http://schemas.openxmlformats.org/presentationml/2006/main">
-  <p:cSld>
-    <p:spTree>
-      <p:nvGrpSpPr>
-        <p:cNvPr id="1" name="">
-          <a:extLst>
-            <a:ext uri="{FF2B5EF4-FFF2-40B4-BE49-F238E27FC236}">
-              <a16:creationId xmlns:a16="http://schemas.microsoft.com/office/drawing/2014/main" id="{812C789B-ED9E-6552-3C89-2A37E2185E24}"/>
-            </a:ext>
-          </a:extLst>
-        </p:cNvPr>
-        <p:cNvGrpSpPr/>
-        <p:nvPr/>
-      </p:nvGrpSpPr>
-      <p:grpSpPr>
-        <a:xfrm>
-          <a:off x="0" y="0"/>
-          <a:ext cx="0" cy="0"/>
-          <a:chOff x="0" y="0"/>
-          <a:chExt cx="0" cy="0"/>
-        </a:xfrm>
-      </p:grpSpPr>
-      <p:sp>
-        <p:nvSpPr>
-          <p:cNvPr id="6" name="Rectángulo 5">
-            <a:extLst>
-              <a:ext uri="{FF2B5EF4-FFF2-40B4-BE49-F238E27FC236}">
-                <a16:creationId xmlns:a16="http://schemas.microsoft.com/office/drawing/2014/main" id="{DBABB88C-863F-A051-B92B-419C48D98DF8}"/>
-              </a:ext>
-            </a:extLst>
-          </p:cNvPr>
-          <p:cNvSpPr/>
-          <p:nvPr/>
-        </p:nvSpPr>
-        <p:spPr>
-          <a:xfrm>
-            <a:off x="0" y="6400800"/>
-            <a:ext cx="2557670" cy="457200"/>
-          </a:xfrm>
-          <a:prstGeom prst="rect">
-            <a:avLst/>
-          </a:prstGeom>
-          <a:solidFill>
-            <a:schemeClr val="bg1">
-              <a:lumMod val="95000"/>
-            </a:schemeClr>
-          </a:solidFill>
-          <a:ln>
-            <a:noFill/>
-          </a:ln>
-        </p:spPr>
-        <p:style>
-          <a:lnRef idx="2">
-            <a:schemeClr val="accent1">
-              <a:shade val="50000"/>
-            </a:schemeClr>
-          </a:lnRef>
-          <a:fillRef idx="1">
-            <a:schemeClr val="accent1"/>
-          </a:fillRef>
-          <a:effectRef idx="0">
-            <a:schemeClr val="accent1"/>
-          </a:effectRef>
-          <a:fontRef idx="minor">
-            <a:schemeClr val="lt1"/>
-          </a:fontRef>
-        </p:style>
-        <p:txBody>
-          <a:bodyPr rtlCol="0" anchor="ctr"/>
-          <a:lstStyle/>
-          <a:p>
-            <a:pPr algn="ctr"/>
-            <a:endParaRPr lang="es-ES"/>
-          </a:p>
-        </p:txBody>
-      </p:sp>
-      <p:sp>
-        <p:nvSpPr>
-          <p:cNvPr id="4" name="Rectángulo: esquinas redondeadas 3">
-            <a:extLst>
-              <a:ext uri="{FF2B5EF4-FFF2-40B4-BE49-F238E27FC236}">
-                <a16:creationId xmlns:a16="http://schemas.microsoft.com/office/drawing/2014/main" id="{1832CEF4-4A09-C457-448E-CAD422E89525}"/>
-              </a:ext>
-            </a:extLst>
-          </p:cNvPr>
-          <p:cNvSpPr/>
-          <p:nvPr/>
-        </p:nvSpPr>
-        <p:spPr>
-          <a:xfrm>
-            <a:off x="505958" y="1104371"/>
-            <a:ext cx="5508000" cy="5324706"/>
-          </a:xfrm>
-          <a:prstGeom prst="roundRect">
-            <a:avLst>
-              <a:gd name="adj" fmla="val 7845"/>
-            </a:avLst>
-          </a:prstGeom>
-          <a:solidFill>
-            <a:schemeClr val="bg1"/>
-          </a:solidFill>
-          <a:ln>
-            <a:noFill/>
-          </a:ln>
-        </p:spPr>
-        <p:style>
-          <a:lnRef idx="2">
-            <a:schemeClr val="accent1">
-              <a:shade val="50000"/>
-            </a:schemeClr>
-          </a:lnRef>
-          <a:fillRef idx="1">
-            <a:schemeClr val="accent1"/>
-          </a:fillRef>
-          <a:effectRef idx="0">
-            <a:schemeClr val="accent1"/>
-          </a:effectRef>
-          <a:fontRef idx="minor">
-            <a:schemeClr val="lt1"/>
-          </a:fontRef>
-        </p:style>
-        <p:txBody>
-          <a:bodyPr rtlCol="0" anchor="ctr"/>
-          <a:lstStyle/>
-          <a:p>
-            <a:pPr algn="ctr"/>
-            <a:endParaRPr lang="es-ES"/>
-          </a:p>
-        </p:txBody>
-      </p:sp>
-      <p:sp>
-        <p:nvSpPr>
-          <p:cNvPr id="5" name="QuadreDeText 3">
-            <a:extLst>
-              <a:ext uri="{FF2B5EF4-FFF2-40B4-BE49-F238E27FC236}">
-                <a16:creationId xmlns:a16="http://schemas.microsoft.com/office/drawing/2014/main" id="{88BB37F3-E934-9179-5238-8C55B40B1B06}"/>
-              </a:ext>
-            </a:extLst>
-          </p:cNvPr>
-          <p:cNvSpPr txBox="1"/>
-          <p:nvPr/>
-        </p:nvSpPr>
-        <p:spPr>
-          <a:xfrm>
-            <a:off x="505958" y="250347"/>
-            <a:ext cx="11230211" cy="923330"/>
-          </a:xfrm>
-          <a:prstGeom prst="rect">
-            <a:avLst/>
-          </a:prstGeom>
-          <a:noFill/>
-        </p:spPr>
-        <p:txBody>
-          <a:bodyPr wrap="square">
-            <a:spAutoFit/>
-          </a:bodyPr>
-          <a:lstStyle/>
-          <a:p>
-            <a:r>
-              <a:rPr lang="es-ES" sz="2400" b="1" dirty="0">
-                <a:solidFill>
-                  <a:schemeClr val="accent3">
-                    <a:lumMod val="50000"/>
-                  </a:schemeClr>
-                </a:solidFill>
-                <a:effectLst/>
-                <a:latin typeface="+mj-lt"/>
-              </a:rPr>
-              <a:t>PROPUESTAS DE AJUSTES DE GESTIÓN DE RIESGOS</a:t>
-            </a:r>
-          </a:p>
-          <a:p>
-            <a:r>
-              <a:rPr lang="es-ES" altLang="es-ES" sz="1400" b="1" dirty="0"/>
-              <a:t>¿Cómo deberíamos ajustar nuestras ofertas y estrategias de gestión de riesgos en función de estos hallazgos? </a:t>
-            </a:r>
-          </a:p>
-          <a:p>
-            <a:endParaRPr lang="es-ES" sz="1400" b="1" dirty="0"/>
-          </a:p>
-        </p:txBody>
-      </p:sp>
-      <p:sp>
-        <p:nvSpPr>
-          <p:cNvPr id="20" name="CuadroTexto 19">
-            <a:extLst>
-              <a:ext uri="{FF2B5EF4-FFF2-40B4-BE49-F238E27FC236}">
-                <a16:creationId xmlns:a16="http://schemas.microsoft.com/office/drawing/2014/main" id="{8D4C4ABA-8C4D-3D1B-ADF0-41CF01169476}"/>
-              </a:ext>
-            </a:extLst>
-          </p:cNvPr>
-          <p:cNvSpPr txBox="1"/>
-          <p:nvPr/>
-        </p:nvSpPr>
-        <p:spPr>
-          <a:xfrm>
-            <a:off x="1977738" y="2935451"/>
-            <a:ext cx="3874361" cy="1208842"/>
-          </a:xfrm>
-          <a:prstGeom prst="roundRect">
-            <a:avLst/>
-          </a:prstGeom>
-          <a:noFill/>
-          <a:ln w="19050">
-            <a:solidFill>
-              <a:srgbClr val="FF8181"/>
-            </a:solidFill>
-            <a:prstDash val="sysDash"/>
-          </a:ln>
-        </p:spPr>
-        <p:txBody>
-          <a:bodyPr wrap="square">
-            <a:spAutoFit/>
-          </a:bodyPr>
-          <a:lstStyle/>
-          <a:p>
-            <a:pPr marL="171450" indent="-171450" algn="just">
-              <a:spcBef>
-                <a:spcPts val="300"/>
-              </a:spcBef>
-              <a:buFont typeface="Arial" panose="020B0604020202020204" pitchFamily="34" charset="0"/>
-              <a:buChar char="•"/>
-            </a:pPr>
-            <a:r>
-              <a:rPr lang="es-ES" sz="1200" dirty="0"/>
-              <a:t>Se piden más préstamos por necesidad que para artículos de lujo o para emprender.</a:t>
-            </a:r>
-          </a:p>
-          <a:p>
-            <a:pPr marL="171450" indent="-171450" algn="just">
-              <a:spcBef>
-                <a:spcPts val="300"/>
-              </a:spcBef>
-              <a:buFont typeface="Arial" panose="020B0604020202020204" pitchFamily="34" charset="0"/>
-              <a:buChar char="•"/>
-            </a:pPr>
-            <a:endParaRPr lang="es-ES" sz="1200" dirty="0"/>
-          </a:p>
-          <a:p>
-            <a:pPr marL="171450" indent="-171450" algn="just">
-              <a:spcBef>
-                <a:spcPts val="300"/>
-              </a:spcBef>
-              <a:buFont typeface="Arial" panose="020B0604020202020204" pitchFamily="34" charset="0"/>
-              <a:buChar char="•"/>
-            </a:pPr>
-            <a:r>
-              <a:rPr lang="es-ES" sz="1200" dirty="0"/>
-              <a:t>Su flujo de efectivo es más frágil; al no tener mayor saldo, pueden incumplir con facilidad.</a:t>
-            </a:r>
-          </a:p>
-        </p:txBody>
-      </p:sp>
-      <p:sp>
-        <p:nvSpPr>
-          <p:cNvPr id="30" name="CuadroTexto 29">
-            <a:extLst>
-              <a:ext uri="{FF2B5EF4-FFF2-40B4-BE49-F238E27FC236}">
-                <a16:creationId xmlns:a16="http://schemas.microsoft.com/office/drawing/2014/main" id="{402A32AE-3750-DF58-DF17-E9552C34F130}"/>
-              </a:ext>
-            </a:extLst>
-          </p:cNvPr>
-          <p:cNvSpPr txBox="1"/>
-          <p:nvPr/>
-        </p:nvSpPr>
-        <p:spPr>
-          <a:xfrm>
-            <a:off x="1939561" y="4615144"/>
-            <a:ext cx="3874360" cy="1413153"/>
-          </a:xfrm>
-          <a:prstGeom prst="roundRect">
-            <a:avLst/>
-          </a:prstGeom>
-          <a:noFill/>
-          <a:ln w="19050">
-            <a:solidFill>
-              <a:srgbClr val="92D050"/>
-            </a:solidFill>
-            <a:prstDash val="sysDash"/>
-          </a:ln>
-        </p:spPr>
-        <p:txBody>
-          <a:bodyPr wrap="square">
-            <a:spAutoFit/>
-          </a:bodyPr>
-          <a:lstStyle/>
-          <a:p>
-            <a:pPr marL="171450" indent="-171450" algn="just">
-              <a:spcBef>
-                <a:spcPts val="300"/>
-              </a:spcBef>
-              <a:buFont typeface="Arial" panose="020B0604020202020204" pitchFamily="34" charset="0"/>
-              <a:buChar char="•"/>
-            </a:pPr>
-            <a:r>
-              <a:rPr lang="es-ES" sz="1200" dirty="0"/>
-              <a:t>Incentivar los préstamos para coches, etc. entre los que tienen mayor saldo con intereses menores.</a:t>
-            </a:r>
-          </a:p>
-          <a:p>
-            <a:pPr marL="171450" indent="-171450" algn="just">
-              <a:spcBef>
-                <a:spcPts val="300"/>
-              </a:spcBef>
-              <a:buFont typeface="Arial" panose="020B0604020202020204" pitchFamily="34" charset="0"/>
-              <a:buChar char="•"/>
-            </a:pPr>
-            <a:endParaRPr lang="es-ES" sz="1200" dirty="0"/>
-          </a:p>
-          <a:p>
-            <a:pPr marL="171450" indent="-171450" algn="just">
-              <a:spcBef>
-                <a:spcPts val="300"/>
-              </a:spcBef>
-              <a:buFont typeface="Arial" panose="020B0604020202020204" pitchFamily="34" charset="0"/>
-              <a:buChar char="•"/>
-            </a:pPr>
-            <a:r>
-              <a:rPr lang="es-ES" sz="1200" dirty="0"/>
-              <a:t>Revisar las condiciones de acceso a los préstamos:  Revisar el histórico de saldo del cliente y darle más o menos préstamo en función de eso.</a:t>
-            </a:r>
-          </a:p>
-        </p:txBody>
-      </p:sp>
-      <p:sp>
-        <p:nvSpPr>
-          <p:cNvPr id="31" name="Rectángulo: esquinas redondeadas 30">
-            <a:extLst>
-              <a:ext uri="{FF2B5EF4-FFF2-40B4-BE49-F238E27FC236}">
-                <a16:creationId xmlns:a16="http://schemas.microsoft.com/office/drawing/2014/main" id="{D6B14624-1CAA-6254-8320-9749CAB8ED3F}"/>
-              </a:ext>
-            </a:extLst>
-          </p:cNvPr>
-          <p:cNvSpPr/>
-          <p:nvPr/>
-        </p:nvSpPr>
-        <p:spPr>
-          <a:xfrm>
-            <a:off x="6228170" y="1104371"/>
-            <a:ext cx="5508000" cy="5324706"/>
-          </a:xfrm>
-          <a:prstGeom prst="roundRect">
-            <a:avLst>
-              <a:gd name="adj" fmla="val 7845"/>
-            </a:avLst>
-          </a:prstGeom>
-          <a:solidFill>
-            <a:schemeClr val="bg1"/>
-          </a:solidFill>
-          <a:ln>
-            <a:noFill/>
-          </a:ln>
-        </p:spPr>
-        <p:style>
-          <a:lnRef idx="2">
-            <a:schemeClr val="accent1">
-              <a:shade val="50000"/>
-            </a:schemeClr>
-          </a:lnRef>
-          <a:fillRef idx="1">
-            <a:schemeClr val="accent1"/>
-          </a:fillRef>
-          <a:effectRef idx="0">
-            <a:schemeClr val="accent1"/>
-          </a:effectRef>
-          <a:fontRef idx="minor">
-            <a:schemeClr val="lt1"/>
-          </a:fontRef>
-        </p:style>
-        <p:txBody>
-          <a:bodyPr rtlCol="0" anchor="ctr"/>
-          <a:lstStyle/>
-          <a:p>
-            <a:pPr algn="ctr"/>
-            <a:endParaRPr lang="es-ES"/>
-          </a:p>
-        </p:txBody>
-      </p:sp>
-      <p:sp>
-        <p:nvSpPr>
-          <p:cNvPr id="36" name="CuadroTexto 35">
-            <a:extLst>
-              <a:ext uri="{FF2B5EF4-FFF2-40B4-BE49-F238E27FC236}">
-                <a16:creationId xmlns:a16="http://schemas.microsoft.com/office/drawing/2014/main" id="{12B785AF-6D8C-51D9-4FE5-2410EE4A9C56}"/>
-              </a:ext>
-            </a:extLst>
-          </p:cNvPr>
-          <p:cNvSpPr txBox="1"/>
-          <p:nvPr/>
-        </p:nvSpPr>
-        <p:spPr>
-          <a:xfrm>
-            <a:off x="7732857" y="2671549"/>
-            <a:ext cx="3873600" cy="1736646"/>
-          </a:xfrm>
-          <a:prstGeom prst="roundRect">
-            <a:avLst/>
-          </a:prstGeom>
-          <a:noFill/>
-          <a:ln w="19050">
-            <a:solidFill>
-              <a:srgbClr val="FF8181"/>
-            </a:solidFill>
-            <a:prstDash val="sysDash"/>
-          </a:ln>
-        </p:spPr>
-        <p:txBody>
-          <a:bodyPr wrap="square">
-            <a:spAutoFit/>
-          </a:bodyPr>
-          <a:lstStyle>
-            <a:defPPr rtl="0">
-              <a:defRPr lang="es-es"/>
-            </a:defPPr>
-            <a:lvl1pPr algn="just">
-              <a:spcBef>
-                <a:spcPts val="300"/>
-              </a:spcBef>
-              <a:defRPr sz="1200" b="1"/>
-            </a:lvl1pPr>
-          </a:lstStyle>
-          <a:p>
-            <a:pPr marL="171450" indent="-171450">
-              <a:spcBef>
-                <a:spcPts val="0"/>
-              </a:spcBef>
-              <a:buFont typeface="Arial" panose="020B0604020202020204" pitchFamily="34" charset="0"/>
-              <a:buChar char="•"/>
-            </a:pPr>
-            <a:r>
-              <a:rPr lang="es-ES" b="0" dirty="0"/>
-              <a:t>Los clientes con hipotecas destinan gran parte de sus ingresos a éstas y, por ello, su saldo es menor y tienen mayor peligro de incumplimiento.</a:t>
-            </a:r>
-          </a:p>
-          <a:p>
-            <a:pPr marL="171450" indent="-171450">
-              <a:spcBef>
-                <a:spcPts val="0"/>
-              </a:spcBef>
-              <a:buFont typeface="Arial" panose="020B0604020202020204" pitchFamily="34" charset="0"/>
-              <a:buChar char="•"/>
-            </a:pPr>
-            <a:endParaRPr lang="es-ES" b="0" dirty="0"/>
-          </a:p>
-          <a:p>
-            <a:pPr marL="171450" indent="-171450">
-              <a:spcBef>
-                <a:spcPts val="0"/>
-              </a:spcBef>
-              <a:buFont typeface="Arial" panose="020B0604020202020204" pitchFamily="34" charset="0"/>
-              <a:buChar char="•"/>
-            </a:pPr>
-            <a:endParaRPr lang="es-ES" b="0" dirty="0"/>
-          </a:p>
-          <a:p>
-            <a:pPr marL="171450" indent="-171450">
-              <a:spcBef>
-                <a:spcPts val="0"/>
-              </a:spcBef>
-              <a:buFont typeface="Arial" panose="020B0604020202020204" pitchFamily="34" charset="0"/>
-              <a:buChar char="•"/>
-            </a:pPr>
-            <a:r>
-              <a:rPr lang="es-ES" b="0" dirty="0"/>
-              <a:t>Los que también tienen préstamo puede que lo hayan pedido para reformar la casa y eso sea una señal de que tienen más ingresos.</a:t>
-            </a:r>
-          </a:p>
-        </p:txBody>
-      </p:sp>
-      <p:sp>
-        <p:nvSpPr>
-          <p:cNvPr id="38" name="CuadroTexto 37">
-            <a:extLst>
-              <a:ext uri="{FF2B5EF4-FFF2-40B4-BE49-F238E27FC236}">
-                <a16:creationId xmlns:a16="http://schemas.microsoft.com/office/drawing/2014/main" id="{69CA13D8-495C-9FBC-E443-F90156725376}"/>
-              </a:ext>
-            </a:extLst>
-          </p:cNvPr>
-          <p:cNvSpPr txBox="1"/>
-          <p:nvPr/>
-        </p:nvSpPr>
-        <p:spPr>
-          <a:xfrm>
-            <a:off x="7696039" y="4555553"/>
-            <a:ext cx="3873600" cy="1532334"/>
-          </a:xfrm>
-          <a:prstGeom prst="roundRect">
-            <a:avLst/>
-          </a:prstGeom>
-          <a:noFill/>
-          <a:ln w="19050">
-            <a:solidFill>
-              <a:srgbClr val="92D050"/>
-            </a:solidFill>
-            <a:prstDash val="sysDash"/>
-          </a:ln>
-        </p:spPr>
-        <p:txBody>
-          <a:bodyPr wrap="square">
-            <a:spAutoFit/>
-          </a:bodyPr>
-          <a:lstStyle>
-            <a:defPPr rtl="0">
-              <a:defRPr lang="es-es"/>
-            </a:defPPr>
-            <a:lvl1pPr algn="just">
-              <a:spcBef>
-                <a:spcPts val="300"/>
-              </a:spcBef>
-              <a:defRPr sz="1200" b="1"/>
-            </a:lvl1pPr>
-          </a:lstStyle>
-          <a:p>
-            <a:pPr marL="171450" indent="-171450">
-              <a:spcBef>
-                <a:spcPts val="0"/>
-              </a:spcBef>
-              <a:buFont typeface="Arial" panose="020B0604020202020204" pitchFamily="34" charset="0"/>
-              <a:buChar char="•"/>
-            </a:pPr>
-            <a:r>
-              <a:rPr lang="es-ES" b="0" dirty="0"/>
-              <a:t>Ajustar las condiciones de las hipotecas a los ingresos reales de los clientes.</a:t>
-            </a:r>
-          </a:p>
-          <a:p>
-            <a:pPr marL="171450" indent="-171450">
-              <a:spcBef>
-                <a:spcPts val="0"/>
-              </a:spcBef>
-              <a:buFont typeface="Arial" panose="020B0604020202020204" pitchFamily="34" charset="0"/>
-              <a:buChar char="•"/>
-            </a:pPr>
-            <a:endParaRPr lang="es-ES" b="0" dirty="0"/>
-          </a:p>
-          <a:p>
-            <a:pPr marL="171450" indent="-171450">
-              <a:spcBef>
-                <a:spcPts val="0"/>
-              </a:spcBef>
-              <a:buFont typeface="Arial" panose="020B0604020202020204" pitchFamily="34" charset="0"/>
-              <a:buChar char="•"/>
-            </a:pPr>
-            <a:r>
-              <a:rPr lang="es-ES" b="0" dirty="0"/>
-              <a:t>Poder suavizar las condiciones puntualmente en caso de necesidad para que no caigan en impago: Congelar el pago de intereses y así bajar las cuotas por un determinado tiempo o alargar el periodo de pago.</a:t>
-            </a:r>
-          </a:p>
-        </p:txBody>
-      </p:sp>
-      <p:sp>
-        <p:nvSpPr>
-          <p:cNvPr id="41" name="Elipse 40">
-            <a:extLst>
-              <a:ext uri="{FF2B5EF4-FFF2-40B4-BE49-F238E27FC236}">
-                <a16:creationId xmlns:a16="http://schemas.microsoft.com/office/drawing/2014/main" id="{726B6686-6E30-955D-B112-5001E3992DB0}"/>
-              </a:ext>
-            </a:extLst>
-          </p:cNvPr>
-          <p:cNvSpPr/>
-          <p:nvPr/>
-        </p:nvSpPr>
-        <p:spPr>
-          <a:xfrm>
-            <a:off x="6429545" y="2843134"/>
-            <a:ext cx="1173600" cy="1171731"/>
-          </a:xfrm>
-          <a:prstGeom prst="ellipse">
-            <a:avLst/>
-          </a:prstGeom>
-          <a:solidFill>
-            <a:srgbClr val="FFB7B7"/>
-          </a:solidFill>
-          <a:ln>
-            <a:solidFill>
-              <a:srgbClr val="FF8181"/>
-            </a:solidFill>
-          </a:ln>
-        </p:spPr>
-        <p:style>
-          <a:lnRef idx="2">
-            <a:schemeClr val="accent1">
-              <a:shade val="50000"/>
-            </a:schemeClr>
-          </a:lnRef>
-          <a:fillRef idx="1">
-            <a:schemeClr val="accent1"/>
-          </a:fillRef>
-          <a:effectRef idx="0">
-            <a:schemeClr val="accent1"/>
-          </a:effectRef>
-          <a:fontRef idx="minor">
-            <a:schemeClr val="lt1"/>
-          </a:fontRef>
-        </p:style>
-        <p:txBody>
-          <a:bodyPr rtlCol="0" anchor="ctr"/>
-          <a:lstStyle/>
-          <a:p>
-            <a:pPr algn="ctr"/>
-            <a:r>
-              <a:rPr lang="es-ES" sz="1400" dirty="0">
-                <a:solidFill>
-                  <a:schemeClr val="tx1"/>
-                </a:solidFill>
-              </a:rPr>
-              <a:t>Posibles </a:t>
-            </a:r>
-            <a:r>
-              <a:rPr lang="es-ES" sz="1400" b="1" dirty="0">
-                <a:solidFill>
-                  <a:schemeClr val="tx1"/>
-                </a:solidFill>
-              </a:rPr>
-              <a:t>CAUSAS</a:t>
-            </a:r>
-          </a:p>
-        </p:txBody>
-      </p:sp>
-      <p:sp>
-        <p:nvSpPr>
-          <p:cNvPr id="42" name="Elipse 41">
-            <a:extLst>
-              <a:ext uri="{FF2B5EF4-FFF2-40B4-BE49-F238E27FC236}">
-                <a16:creationId xmlns:a16="http://schemas.microsoft.com/office/drawing/2014/main" id="{AEF366BB-8534-D16B-88EC-C0A8213619CC}"/>
-              </a:ext>
-            </a:extLst>
-          </p:cNvPr>
-          <p:cNvSpPr/>
-          <p:nvPr/>
-        </p:nvSpPr>
-        <p:spPr>
-          <a:xfrm>
-            <a:off x="6371770" y="4735858"/>
-            <a:ext cx="1173600" cy="1171731"/>
-          </a:xfrm>
-          <a:prstGeom prst="ellipse">
-            <a:avLst/>
-          </a:prstGeom>
-          <a:solidFill>
-            <a:srgbClr val="D2ECB6"/>
-          </a:solidFill>
-          <a:ln>
-            <a:solidFill>
-              <a:srgbClr val="92D050"/>
-            </a:solidFill>
-          </a:ln>
-        </p:spPr>
-        <p:style>
-          <a:lnRef idx="2">
-            <a:schemeClr val="accent1">
-              <a:shade val="50000"/>
-            </a:schemeClr>
-          </a:lnRef>
-          <a:fillRef idx="1">
-            <a:schemeClr val="accent1"/>
-          </a:fillRef>
-          <a:effectRef idx="0">
-            <a:schemeClr val="accent1"/>
-          </a:effectRef>
-          <a:fontRef idx="minor">
-            <a:schemeClr val="lt1"/>
-          </a:fontRef>
-        </p:style>
-        <p:txBody>
-          <a:bodyPr rtlCol="0" anchor="ctr"/>
-          <a:lstStyle/>
-          <a:p>
-            <a:pPr algn="ctr"/>
-            <a:r>
-              <a:rPr lang="es-ES" sz="1400" b="1" dirty="0">
-                <a:solidFill>
-                  <a:schemeClr val="tx1"/>
-                </a:solidFill>
-              </a:rPr>
-              <a:t>RECO-MENDA-CIONES</a:t>
-            </a:r>
-          </a:p>
-        </p:txBody>
-      </p:sp>
-      <p:sp>
-        <p:nvSpPr>
-          <p:cNvPr id="43" name="Elipse 42">
-            <a:extLst>
-              <a:ext uri="{FF2B5EF4-FFF2-40B4-BE49-F238E27FC236}">
-                <a16:creationId xmlns:a16="http://schemas.microsoft.com/office/drawing/2014/main" id="{4DA4281C-F29A-6A7D-C796-6AFA6C3869FF}"/>
-              </a:ext>
-            </a:extLst>
-          </p:cNvPr>
-          <p:cNvSpPr/>
-          <p:nvPr/>
-        </p:nvSpPr>
-        <p:spPr>
-          <a:xfrm>
-            <a:off x="622361" y="4735856"/>
-            <a:ext cx="1173600" cy="1171731"/>
-          </a:xfrm>
-          <a:prstGeom prst="ellipse">
-            <a:avLst/>
-          </a:prstGeom>
-          <a:solidFill>
-            <a:srgbClr val="D2ECB6"/>
-          </a:solidFill>
-          <a:ln>
-            <a:solidFill>
-              <a:srgbClr val="92D050"/>
-            </a:solidFill>
-          </a:ln>
-        </p:spPr>
-        <p:style>
-          <a:lnRef idx="2">
-            <a:schemeClr val="accent1">
-              <a:shade val="50000"/>
-            </a:schemeClr>
-          </a:lnRef>
-          <a:fillRef idx="1">
-            <a:schemeClr val="accent1"/>
-          </a:fillRef>
-          <a:effectRef idx="0">
-            <a:schemeClr val="accent1"/>
-          </a:effectRef>
-          <a:fontRef idx="minor">
-            <a:schemeClr val="lt1"/>
-          </a:fontRef>
-        </p:style>
-        <p:txBody>
-          <a:bodyPr rtlCol="0" anchor="ctr"/>
-          <a:lstStyle/>
-          <a:p>
-            <a:pPr algn="ctr"/>
-            <a:r>
-              <a:rPr lang="es-ES" sz="1400" b="1" dirty="0">
-                <a:solidFill>
-                  <a:schemeClr val="tx1"/>
-                </a:solidFill>
-              </a:rPr>
-              <a:t>RECO-MENDA-CIONES</a:t>
-            </a:r>
-          </a:p>
-        </p:txBody>
-      </p:sp>
-      <p:sp>
-        <p:nvSpPr>
-          <p:cNvPr id="44" name="Elipse 43">
-            <a:extLst>
-              <a:ext uri="{FF2B5EF4-FFF2-40B4-BE49-F238E27FC236}">
-                <a16:creationId xmlns:a16="http://schemas.microsoft.com/office/drawing/2014/main" id="{B3D7F275-3643-5356-F0BB-4663C892B949}"/>
-              </a:ext>
-            </a:extLst>
-          </p:cNvPr>
-          <p:cNvSpPr/>
-          <p:nvPr/>
-        </p:nvSpPr>
-        <p:spPr>
-          <a:xfrm>
-            <a:off x="551159" y="2972562"/>
-            <a:ext cx="1173600" cy="1171731"/>
-          </a:xfrm>
-          <a:prstGeom prst="ellipse">
-            <a:avLst/>
-          </a:prstGeom>
-          <a:solidFill>
-            <a:srgbClr val="FFB7B7"/>
-          </a:solidFill>
-          <a:ln>
-            <a:solidFill>
-              <a:srgbClr val="FF8181"/>
-            </a:solidFill>
-          </a:ln>
-        </p:spPr>
-        <p:style>
-          <a:lnRef idx="2">
-            <a:schemeClr val="accent1">
-              <a:shade val="50000"/>
-            </a:schemeClr>
-          </a:lnRef>
-          <a:fillRef idx="1">
-            <a:schemeClr val="accent1"/>
-          </a:fillRef>
-          <a:effectRef idx="0">
-            <a:schemeClr val="accent1"/>
-          </a:effectRef>
-          <a:fontRef idx="minor">
-            <a:schemeClr val="lt1"/>
-          </a:fontRef>
-        </p:style>
-        <p:txBody>
-          <a:bodyPr rtlCol="0" anchor="ctr"/>
-          <a:lstStyle/>
-          <a:p>
-            <a:pPr algn="ctr"/>
-            <a:r>
-              <a:rPr lang="es-ES" sz="1400" dirty="0">
-                <a:solidFill>
-                  <a:schemeClr val="tx1"/>
-                </a:solidFill>
-              </a:rPr>
-              <a:t>Posibles </a:t>
-            </a:r>
-            <a:r>
-              <a:rPr lang="es-ES" sz="1400" b="1" dirty="0">
-                <a:solidFill>
-                  <a:schemeClr val="tx1"/>
-                </a:solidFill>
-              </a:rPr>
-              <a:t>CAUSAS</a:t>
-            </a:r>
-          </a:p>
-        </p:txBody>
-      </p:sp>
-      <p:sp>
-        <p:nvSpPr>
-          <p:cNvPr id="2" name="QuadreDeText 1">
-            <a:extLst>
-              <a:ext uri="{FF2B5EF4-FFF2-40B4-BE49-F238E27FC236}">
-                <a16:creationId xmlns:a16="http://schemas.microsoft.com/office/drawing/2014/main" id="{80D1F29C-338D-A3A0-399C-DA986318401D}"/>
-              </a:ext>
-            </a:extLst>
-          </p:cNvPr>
-          <p:cNvSpPr txBox="1"/>
-          <p:nvPr/>
-        </p:nvSpPr>
-        <p:spPr>
-          <a:xfrm>
-            <a:off x="1987466" y="1546180"/>
-            <a:ext cx="3933561" cy="617733"/>
-          </a:xfrm>
-          <a:prstGeom prst="rect">
-            <a:avLst/>
-          </a:prstGeom>
-          <a:noFill/>
-        </p:spPr>
-        <p:txBody>
-          <a:bodyPr wrap="square">
-            <a:spAutoFit/>
-          </a:bodyPr>
-          <a:lstStyle>
-            <a:defPPr rtl="0">
-              <a:defRPr lang="es-es"/>
-            </a:defPPr>
-            <a:lvl1pPr>
-              <a:lnSpc>
-                <a:spcPct val="150000"/>
-              </a:lnSpc>
-              <a:defRPr/>
-            </a:lvl1pPr>
-          </a:lstStyle>
-          <a:p>
-            <a:r>
-              <a:rPr lang="es-ES" altLang="es-ES" sz="1200" b="1" dirty="0"/>
-              <a:t>Tienden a tener mucho menor saldo</a:t>
-            </a:r>
-          </a:p>
-          <a:p>
-            <a:r>
-              <a:rPr lang="es-ES" altLang="es-ES" sz="1200" b="1" dirty="0"/>
-              <a:t>Tienden a tener mucho más riesgo de incumplimiento</a:t>
-            </a:r>
-          </a:p>
-        </p:txBody>
-      </p:sp>
-      <p:sp>
-        <p:nvSpPr>
-          <p:cNvPr id="3" name="Elipse 2">
-            <a:extLst>
-              <a:ext uri="{FF2B5EF4-FFF2-40B4-BE49-F238E27FC236}">
-                <a16:creationId xmlns:a16="http://schemas.microsoft.com/office/drawing/2014/main" id="{2CAA5F33-D214-CC8B-A2D4-F415FAD0B231}"/>
-              </a:ext>
-            </a:extLst>
-          </p:cNvPr>
-          <p:cNvSpPr/>
-          <p:nvPr/>
-        </p:nvSpPr>
-        <p:spPr>
-          <a:xfrm>
-            <a:off x="599654" y="1296907"/>
-            <a:ext cx="1173600" cy="1120646"/>
-          </a:xfrm>
-          <a:prstGeom prst="ellipse">
-            <a:avLst/>
-          </a:prstGeom>
-          <a:solidFill>
-            <a:schemeClr val="accent5">
-              <a:lumMod val="25000"/>
-              <a:lumOff val="75000"/>
-            </a:schemeClr>
-          </a:solidFill>
-          <a:ln>
-            <a:solidFill>
-              <a:schemeClr val="accent5">
-                <a:lumMod val="50000"/>
-                <a:lumOff val="50000"/>
-              </a:schemeClr>
-            </a:solidFill>
-          </a:ln>
-        </p:spPr>
-        <p:style>
-          <a:lnRef idx="2">
-            <a:schemeClr val="accent1">
-              <a:shade val="50000"/>
-            </a:schemeClr>
-          </a:lnRef>
-          <a:fillRef idx="1">
-            <a:schemeClr val="accent1"/>
-          </a:fillRef>
-          <a:effectRef idx="0">
-            <a:schemeClr val="accent1"/>
-          </a:effectRef>
-          <a:fontRef idx="minor">
-            <a:schemeClr val="lt1"/>
-          </a:fontRef>
-        </p:style>
-        <p:txBody>
-          <a:bodyPr rtlCol="0" anchor="ctr"/>
-          <a:lstStyle/>
-          <a:p>
-            <a:pPr algn="ctr"/>
-            <a:r>
-              <a:rPr lang="es-ES" sz="1400" dirty="0">
-                <a:solidFill>
-                  <a:schemeClr val="tx1"/>
-                </a:solidFill>
-              </a:rPr>
-              <a:t>Clientes con</a:t>
-            </a:r>
-          </a:p>
-          <a:p>
-            <a:pPr algn="ctr"/>
-            <a:r>
-              <a:rPr lang="es-ES" sz="1400" b="1" dirty="0">
-                <a:solidFill>
-                  <a:schemeClr val="tx1"/>
-                </a:solidFill>
-              </a:rPr>
-              <a:t>PRÉSTAMOS</a:t>
-            </a:r>
-          </a:p>
-        </p:txBody>
-      </p:sp>
-      <p:sp>
-        <p:nvSpPr>
-          <p:cNvPr id="7" name="Elipse 3">
-            <a:extLst>
-              <a:ext uri="{FF2B5EF4-FFF2-40B4-BE49-F238E27FC236}">
-                <a16:creationId xmlns:a16="http://schemas.microsoft.com/office/drawing/2014/main" id="{B2B7A681-6DC4-190D-D9BA-75D280946319}"/>
-              </a:ext>
-            </a:extLst>
-          </p:cNvPr>
-          <p:cNvSpPr/>
-          <p:nvPr/>
-        </p:nvSpPr>
-        <p:spPr>
-          <a:xfrm>
-            <a:off x="6391631" y="1230248"/>
-            <a:ext cx="1173600" cy="1171731"/>
-          </a:xfrm>
-          <a:prstGeom prst="ellipse">
-            <a:avLst/>
-          </a:prstGeom>
-          <a:solidFill>
-            <a:schemeClr val="accent5">
-              <a:lumMod val="25000"/>
-              <a:lumOff val="75000"/>
-            </a:schemeClr>
-          </a:solidFill>
-          <a:ln>
-            <a:solidFill>
-              <a:schemeClr val="accent5">
-                <a:lumMod val="50000"/>
-                <a:lumOff val="50000"/>
-              </a:schemeClr>
-            </a:solidFill>
-          </a:ln>
-        </p:spPr>
-        <p:style>
-          <a:lnRef idx="2">
-            <a:schemeClr val="accent1">
-              <a:shade val="50000"/>
-            </a:schemeClr>
-          </a:lnRef>
-          <a:fillRef idx="1">
-            <a:schemeClr val="accent1"/>
-          </a:fillRef>
-          <a:effectRef idx="0">
-            <a:schemeClr val="accent1"/>
-          </a:effectRef>
-          <a:fontRef idx="minor">
-            <a:schemeClr val="lt1"/>
-          </a:fontRef>
-        </p:style>
-        <p:txBody>
-          <a:bodyPr rtlCol="0" anchor="ctr"/>
-          <a:lstStyle/>
-          <a:p>
-            <a:pPr algn="ctr"/>
-            <a:r>
-              <a:rPr lang="es-ES" sz="1400" dirty="0">
-                <a:solidFill>
-                  <a:schemeClr val="tx1"/>
-                </a:solidFill>
-              </a:rPr>
-              <a:t>Clientes con</a:t>
-            </a:r>
-          </a:p>
-          <a:p>
-            <a:pPr algn="ctr"/>
-            <a:r>
-              <a:rPr lang="es-ES" sz="1400" b="1" dirty="0">
-                <a:solidFill>
-                  <a:schemeClr val="tx1"/>
-                </a:solidFill>
-              </a:rPr>
-              <a:t>HIPOTECAS</a:t>
-            </a:r>
-          </a:p>
-        </p:txBody>
-      </p:sp>
-      <p:sp>
-        <p:nvSpPr>
-          <p:cNvPr id="8" name="CuadroTexto 6">
-            <a:extLst>
-              <a:ext uri="{FF2B5EF4-FFF2-40B4-BE49-F238E27FC236}">
-                <a16:creationId xmlns:a16="http://schemas.microsoft.com/office/drawing/2014/main" id="{153DFE94-1372-87D5-0DA0-DA5787B5D984}"/>
-              </a:ext>
-            </a:extLst>
-          </p:cNvPr>
-          <p:cNvSpPr txBox="1"/>
-          <p:nvPr/>
-        </p:nvSpPr>
-        <p:spPr>
-          <a:xfrm>
-            <a:off x="7603145" y="1245822"/>
-            <a:ext cx="4347237" cy="1171731"/>
-          </a:xfrm>
-          <a:prstGeom prst="rect">
-            <a:avLst/>
-          </a:prstGeom>
-          <a:noFill/>
-        </p:spPr>
-        <p:txBody>
-          <a:bodyPr wrap="square">
-            <a:spAutoFit/>
-          </a:bodyPr>
-          <a:lstStyle/>
-          <a:p>
-            <a:pPr>
-              <a:lnSpc>
-                <a:spcPct val="150000"/>
-              </a:lnSpc>
-            </a:pPr>
-            <a:r>
-              <a:rPr lang="es-ES" altLang="es-ES" sz="1200" b="1" dirty="0"/>
-              <a:t>Tienden a tener un saldo un poco menor</a:t>
-            </a:r>
-          </a:p>
-          <a:p>
-            <a:pPr>
-              <a:lnSpc>
-                <a:spcPct val="150000"/>
-              </a:lnSpc>
-            </a:pPr>
-            <a:r>
-              <a:rPr lang="es-ES" altLang="es-ES" sz="1200" b="1" dirty="0"/>
-              <a:t>Tienden a tener un poco más de riesgo que los que no tienen préstamo</a:t>
-            </a:r>
-          </a:p>
-          <a:p>
-            <a:pPr>
-              <a:lnSpc>
-                <a:spcPct val="150000"/>
-              </a:lnSpc>
-            </a:pPr>
-            <a:r>
-              <a:rPr lang="es-ES" altLang="es-ES" sz="1200" b="1" dirty="0"/>
-              <a:t>Tienden a tener menor riesgo en los que tienen también préstamo</a:t>
-            </a:r>
-          </a:p>
-        </p:txBody>
-      </p:sp>
-    </p:spTree>
-    <p:extLst>
-      <p:ext uri="{BB962C8B-B14F-4D97-AF65-F5344CB8AC3E}">
-        <p14:creationId xmlns:p14="http://schemas.microsoft.com/office/powerpoint/2010/main" val="1103751901"/>
-      </p:ext>
-    </p:extLst>
-  </p:cSld>
-  <p:clrMapOvr>
-    <a:masterClrMapping/>
-  </p:clrMapOvr>
-</p:sld>
-</file>
-
-<file path=ppt/slides/slide12.xml><?xml version="1.0" encoding="utf-8"?>
-<p:sld xmlns:a="http://schemas.openxmlformats.org/drawingml/2006/main" xmlns:r="http://schemas.openxmlformats.org/officeDocument/2006/relationships" xmlns:p="http://schemas.openxmlformats.org/presentationml/2006/main">
-  <p:cSld>
     <p:bg>
       <p:bgPr>
         <a:blipFill dpi="0" rotWithShape="1">
@@ -15469,14 +13217,14 @@
           <p:nvPr>
             <p:extLst>
               <p:ext uri="{D42A27DB-BD31-4B8C-83A1-F6EECF244321}">
-                <p14:modId xmlns:p14="http://schemas.microsoft.com/office/powerpoint/2010/main" val="4025258182"/>
+                <p14:modId xmlns:p14="http://schemas.microsoft.com/office/powerpoint/2010/main" val="2721419558"/>
               </p:ext>
             </p:extLst>
           </p:nvPr>
         </p:nvGraphicFramePr>
         <p:xfrm>
           <a:off x="505958" y="1334673"/>
-          <a:ext cx="3420582" cy="1923600"/>
+          <a:ext cx="3420582" cy="1984560"/>
         </p:xfrm>
         <a:graphic>
           <a:graphicData uri="http://schemas.openxmlformats.org/drawingml/2006/table">
@@ -15515,7 +13263,7 @@
                     <a:p>
                       <a:pPr algn="ctr"/>
                       <a:r>
-                        <a:rPr lang="ca-ES" sz="1000" dirty="0">
+                        <a:rPr lang="ca-ES" sz="1100" dirty="0">
                           <a:solidFill>
                             <a:schemeClr val="tx1"/>
                           </a:solidFill>
@@ -15523,14 +13271,14 @@
                         <a:t>Saldo </a:t>
                       </a:r>
                       <a:r>
-                        <a:rPr lang="ca-ES" sz="1000" dirty="0" err="1">
+                        <a:rPr lang="ca-ES" sz="1100" dirty="0" err="1">
                           <a:solidFill>
                             <a:schemeClr val="tx1"/>
                           </a:solidFill>
                         </a:rPr>
                         <a:t>Medio</a:t>
                       </a:r>
-                      <a:endParaRPr lang="ca-ES" sz="1000" dirty="0">
+                      <a:endParaRPr lang="ca-ES" sz="1100" dirty="0">
                         <a:solidFill>
                           <a:schemeClr val="tx1"/>
                         </a:solidFill>
@@ -15539,7 +13287,7 @@
                     <a:p>
                       <a:pPr algn="ctr"/>
                       <a:r>
-                        <a:rPr lang="ca-ES" sz="1000" dirty="0">
+                        <a:rPr lang="ca-ES" sz="1100" dirty="0">
                           <a:solidFill>
                             <a:schemeClr val="tx1"/>
                           </a:solidFill>
@@ -15550,7 +13298,7 @@
                     <a:p>
                       <a:pPr algn="ctr"/>
                       <a:r>
-                        <a:rPr lang="ca-ES" sz="1000" dirty="0" err="1">
+                        <a:rPr lang="ca-ES" sz="1100" dirty="0" err="1">
                           <a:solidFill>
                             <a:schemeClr val="tx1"/>
                           </a:solidFill>
@@ -15558,7 +13306,7 @@
                         <a:t>Préstamo</a:t>
                       </a:r>
                       <a:r>
-                        <a:rPr lang="ca-ES" sz="1000" dirty="0">
+                        <a:rPr lang="ca-ES" sz="1100" dirty="0">
                           <a:solidFill>
                             <a:schemeClr val="tx1"/>
                           </a:solidFill>
@@ -16218,7 +13966,7 @@
           <p:nvPr>
             <p:extLst>
               <p:ext uri="{D42A27DB-BD31-4B8C-83A1-F6EECF244321}">
-                <p14:modId xmlns:p14="http://schemas.microsoft.com/office/powerpoint/2010/main" val="26873882"/>
+                <p14:modId xmlns:p14="http://schemas.microsoft.com/office/powerpoint/2010/main" val="975278084"/>
               </p:ext>
             </p:extLst>
           </p:nvPr>
@@ -16264,7 +14012,7 @@
                     <a:p>
                       <a:pPr algn="ctr"/>
                       <a:r>
-                        <a:rPr lang="es-ES" sz="1000" noProof="0" dirty="0">
+                        <a:rPr lang="es-ES" sz="1100" noProof="0" dirty="0">
                           <a:solidFill>
                             <a:schemeClr val="tx1"/>
                           </a:solidFill>
@@ -16275,7 +14023,7 @@
                     <a:p>
                       <a:pPr algn="ctr"/>
                       <a:r>
-                        <a:rPr lang="es-ES" sz="1000" noProof="0" dirty="0">
+                        <a:rPr lang="es-ES" sz="1100" noProof="0" dirty="0">
                           <a:solidFill>
                             <a:schemeClr val="tx1"/>
                           </a:solidFill>
@@ -16286,7 +14034,7 @@
                     <a:p>
                       <a:pPr algn="ctr"/>
                       <a:r>
-                        <a:rPr lang="es-ES" sz="1000" noProof="0" dirty="0">
+                        <a:rPr lang="es-ES" sz="1100" noProof="0" dirty="0">
                           <a:solidFill>
                             <a:schemeClr val="tx1"/>
                           </a:solidFill>
@@ -17174,19 +14922,7 @@
             </a:r>
             <a:r>
               <a:rPr lang="es-ES" sz="1300" dirty="0"/>
-              <a:t>pero en menor medida </a:t>
-            </a:r>
-            <a:r>
-              <a:rPr lang="es-ES" sz="1300" dirty="0">
-                <a:highlight>
-                  <a:srgbClr val="FFFF00"/>
-                </a:highlight>
-              </a:rPr>
-              <a:t>(-10,8% </a:t>
-            </a:r>
-            <a:r>
-              <a:rPr lang="es-ES" sz="1300" dirty="0"/>
-              <a:t>y -27,2%)</a:t>
+              <a:t>pero en menor medida (-10,8% y -27,2%)</a:t>
             </a:r>
           </a:p>
         </p:txBody>
@@ -17243,19 +14979,7 @@
             </a:r>
             <a:r>
               <a:rPr lang="es-ES" sz="1300" dirty="0"/>
-              <a:t> entre un </a:t>
-            </a:r>
-            <a:r>
-              <a:rPr lang="es-ES" sz="1300" dirty="0">
-                <a:highlight>
-                  <a:srgbClr val="FFFF00"/>
-                </a:highlight>
-              </a:rPr>
-              <a:t>50,9%</a:t>
-            </a:r>
-            <a:r>
-              <a:rPr lang="es-ES" sz="1300" dirty="0"/>
-              <a:t> y 472,8% </a:t>
+              <a:t> entre un 50,9% y 472,8% </a:t>
             </a:r>
             <a:r>
               <a:rPr lang="es-ES" sz="1300" b="1" dirty="0"/>
@@ -17300,11 +15024,7 @@
               <a:t>lo decrece </a:t>
             </a:r>
             <a:r>
-              <a:rPr lang="es-ES" sz="1300" dirty="0">
-                <a:highlight>
-                  <a:srgbClr val="FFFF00"/>
-                </a:highlight>
-              </a:rPr>
+              <a:rPr lang="es-ES" sz="1300" dirty="0"/>
               <a:t>-47,1% </a:t>
             </a:r>
             <a:r>
@@ -17462,7 +15182,13 @@
   <p:cSld>
     <p:spTree>
       <p:nvGrpSpPr>
-        <p:cNvPr id="1" name=""/>
+        <p:cNvPr id="1" name="">
+          <a:extLst>
+            <a:ext uri="{FF2B5EF4-FFF2-40B4-BE49-F238E27FC236}">
+              <a16:creationId xmlns:a16="http://schemas.microsoft.com/office/drawing/2014/main" id="{812C789B-ED9E-6552-3C89-2A37E2185E24}"/>
+            </a:ext>
+          </a:extLst>
+        </p:cNvPr>
         <p:cNvGrpSpPr/>
         <p:nvPr/>
       </p:nvGrpSpPr>
@@ -17476,10 +15202,10 @@
       </p:grpSpPr>
       <p:sp>
         <p:nvSpPr>
-          <p:cNvPr id="2" name="Rectángulo 1">
-            <a:extLst>
-              <a:ext uri="{FF2B5EF4-FFF2-40B4-BE49-F238E27FC236}">
-                <a16:creationId xmlns:a16="http://schemas.microsoft.com/office/drawing/2014/main" id="{AE075C58-333E-B20B-FF4A-C0CCDF7254CF}"/>
+          <p:cNvPr id="6" name="Rectángulo 5">
+            <a:extLst>
+              <a:ext uri="{FF2B5EF4-FFF2-40B4-BE49-F238E27FC236}">
+                <a16:creationId xmlns:a16="http://schemas.microsoft.com/office/drawing/2014/main" id="{DBABB88C-863F-A051-B92B-419C48D98DF8}"/>
               </a:ext>
             </a:extLst>
           </p:cNvPr>
@@ -17530,109 +15256,10 @@
       </p:sp>
       <p:sp>
         <p:nvSpPr>
-          <p:cNvPr id="5" name="QuadreDeText 3">
-            <a:extLst>
-              <a:ext uri="{FF2B5EF4-FFF2-40B4-BE49-F238E27FC236}">
-                <a16:creationId xmlns:a16="http://schemas.microsoft.com/office/drawing/2014/main" id="{DB2F1EA4-1C0B-78BF-E2EA-8AB81F4C9702}"/>
-              </a:ext>
-            </a:extLst>
-          </p:cNvPr>
-          <p:cNvSpPr txBox="1"/>
-          <p:nvPr/>
-        </p:nvSpPr>
-        <p:spPr>
-          <a:xfrm>
-            <a:off x="505958" y="250347"/>
-            <a:ext cx="11230211" cy="677108"/>
-          </a:xfrm>
-          <a:prstGeom prst="rect">
-            <a:avLst/>
-          </a:prstGeom>
-          <a:noFill/>
-        </p:spPr>
-        <p:txBody>
-          <a:bodyPr wrap="square">
-            <a:spAutoFit/>
-          </a:bodyPr>
-          <a:lstStyle/>
-          <a:p>
-            <a:r>
-              <a:rPr lang="es-ES" sz="2400" b="1" dirty="0">
-                <a:solidFill>
-                  <a:schemeClr val="accent3">
-                    <a:lumMod val="50000"/>
-                  </a:schemeClr>
-                </a:solidFill>
-                <a:latin typeface="+mj-lt"/>
-              </a:rPr>
-              <a:t>RESPUESTAS</a:t>
-            </a:r>
-          </a:p>
-          <a:p>
-            <a:r>
-              <a:rPr lang="es-ES" altLang="es-ES" sz="1400" b="1" dirty="0"/>
-              <a:t>¿Los clientes con préstamos e hipotecas tienden a tener un saldo medio más bajo o más riesgo de incumplimiento? </a:t>
-            </a:r>
-          </a:p>
-        </p:txBody>
-      </p:sp>
-      <p:sp>
-        <p:nvSpPr>
-          <p:cNvPr id="14" name="QuadreDeText 13">
-            <a:extLst>
-              <a:ext uri="{FF2B5EF4-FFF2-40B4-BE49-F238E27FC236}">
-                <a16:creationId xmlns:a16="http://schemas.microsoft.com/office/drawing/2014/main" id="{25E84E95-7FB0-143A-D04B-1F6F4040721D}"/>
-              </a:ext>
-            </a:extLst>
-          </p:cNvPr>
-          <p:cNvSpPr txBox="1"/>
-          <p:nvPr/>
-        </p:nvSpPr>
-        <p:spPr>
-          <a:xfrm>
-            <a:off x="3950972" y="2066657"/>
-            <a:ext cx="5636045" cy="880369"/>
-          </a:xfrm>
-          <a:prstGeom prst="rect">
-            <a:avLst/>
-          </a:prstGeom>
-          <a:noFill/>
-        </p:spPr>
-        <p:txBody>
-          <a:bodyPr wrap="square">
-            <a:spAutoFit/>
-          </a:bodyPr>
-          <a:lstStyle>
-            <a:defPPr rtl="0">
-              <a:defRPr lang="es-es"/>
-            </a:defPPr>
-            <a:lvl1pPr>
-              <a:lnSpc>
-                <a:spcPct val="150000"/>
-              </a:lnSpc>
-              <a:defRPr/>
-            </a:lvl1pPr>
-          </a:lstStyle>
-          <a:p>
-            <a:r>
-              <a:rPr lang="es-ES" altLang="es-ES" dirty="0"/>
-              <a:t>Tienden a tener mucho menor saldo</a:t>
-            </a:r>
-          </a:p>
-          <a:p>
-            <a:r>
-              <a:rPr lang="es-ES" altLang="es-ES" dirty="0"/>
-              <a:t>Tienden a tener mucho más riesgo de incumplimiento</a:t>
-            </a:r>
-          </a:p>
-        </p:txBody>
-      </p:sp>
-      <p:sp>
-        <p:nvSpPr>
-          <p:cNvPr id="3" name="Elipse 2">
-            <a:extLst>
-              <a:ext uri="{FF2B5EF4-FFF2-40B4-BE49-F238E27FC236}">
-                <a16:creationId xmlns:a16="http://schemas.microsoft.com/office/drawing/2014/main" id="{50BAAC89-F0EF-0DB5-A040-D3620F9E5BB4}"/>
+          <p:cNvPr id="4" name="Rectángulo: esquinas redondeadas 3">
+            <a:extLst>
+              <a:ext uri="{FF2B5EF4-FFF2-40B4-BE49-F238E27FC236}">
+                <a16:creationId xmlns:a16="http://schemas.microsoft.com/office/drawing/2014/main" id="{1832CEF4-4A09-C457-448E-CAD422E89525}"/>
               </a:ext>
             </a:extLst>
           </p:cNvPr>
@@ -17641,25 +15268,19 @@
         </p:nvSpPr>
         <p:spPr>
           <a:xfrm>
-            <a:off x="1584671" y="1696842"/>
-            <a:ext cx="1620000" cy="1620000"/>
-          </a:xfrm>
-          <a:prstGeom prst="ellipse">
-            <a:avLst/>
+            <a:off x="505958" y="1104371"/>
+            <a:ext cx="5508000" cy="5324706"/>
+          </a:xfrm>
+          <a:prstGeom prst="roundRect">
+            <a:avLst>
+              <a:gd name="adj" fmla="val 7845"/>
+            </a:avLst>
           </a:prstGeom>
           <a:solidFill>
-            <a:schemeClr val="accent5">
-              <a:lumMod val="25000"/>
-              <a:lumOff val="75000"/>
-            </a:schemeClr>
+            <a:schemeClr val="bg1"/>
           </a:solidFill>
           <a:ln>
-            <a:solidFill>
-              <a:schemeClr val="accent5">
-                <a:lumMod val="50000"/>
-                <a:lumOff val="50000"/>
-              </a:schemeClr>
-            </a:solidFill>
+            <a:noFill/>
           </a:ln>
         </p:spPr>
         <p:style>
@@ -17683,34 +15304,208 @@
           <a:lstStyle/>
           <a:p>
             <a:pPr algn="ctr"/>
-            <a:r>
-              <a:rPr lang="es-ES" sz="1400" dirty="0">
+            <a:endParaRPr lang="es-ES"/>
+          </a:p>
+        </p:txBody>
+      </p:sp>
+      <p:sp>
+        <p:nvSpPr>
+          <p:cNvPr id="5" name="QuadreDeText 3">
+            <a:extLst>
+              <a:ext uri="{FF2B5EF4-FFF2-40B4-BE49-F238E27FC236}">
+                <a16:creationId xmlns:a16="http://schemas.microsoft.com/office/drawing/2014/main" id="{88BB37F3-E934-9179-5238-8C55B40B1B06}"/>
+              </a:ext>
+            </a:extLst>
+          </p:cNvPr>
+          <p:cNvSpPr txBox="1"/>
+          <p:nvPr/>
+        </p:nvSpPr>
+        <p:spPr>
+          <a:xfrm>
+            <a:off x="505958" y="250347"/>
+            <a:ext cx="11230211" cy="923330"/>
+          </a:xfrm>
+          <a:prstGeom prst="rect">
+            <a:avLst/>
+          </a:prstGeom>
+          <a:noFill/>
+        </p:spPr>
+        <p:txBody>
+          <a:bodyPr wrap="square">
+            <a:spAutoFit/>
+          </a:bodyPr>
+          <a:lstStyle/>
+          <a:p>
+            <a:r>
+              <a:rPr lang="es-ES" sz="2400" b="1" dirty="0">
                 <a:solidFill>
-                  <a:schemeClr val="tx1"/>
+                  <a:schemeClr val="accent3">
+                    <a:lumMod val="50000"/>
+                  </a:schemeClr>
                 </a:solidFill>
+                <a:effectLst/>
+                <a:latin typeface="+mj-lt"/>
               </a:rPr>
-              <a:t>Clientes con</a:t>
-            </a:r>
-          </a:p>
-          <a:p>
-            <a:pPr algn="ctr"/>
-            <a:r>
-              <a:rPr lang="es-ES" sz="1400" b="1" dirty="0">
-                <a:solidFill>
-                  <a:schemeClr val="tx1"/>
-                </a:solidFill>
-              </a:rPr>
-              <a:t>PRÉSTAMOS</a:t>
-            </a:r>
-          </a:p>
-        </p:txBody>
-      </p:sp>
-      <p:sp>
-        <p:nvSpPr>
-          <p:cNvPr id="4" name="Elipse 3">
-            <a:extLst>
-              <a:ext uri="{FF2B5EF4-FFF2-40B4-BE49-F238E27FC236}">
-                <a16:creationId xmlns:a16="http://schemas.microsoft.com/office/drawing/2014/main" id="{71BD2C71-4A01-264A-FBBC-D82911106B4A}"/>
+              <a:t>PROPUESTAS DE AJUSTES DE GESTIÓN DE RIESGOS</a:t>
+            </a:r>
+          </a:p>
+          <a:p>
+            <a:r>
+              <a:rPr lang="es-ES" altLang="es-ES" sz="1400" b="1" dirty="0"/>
+              <a:t>¿Cómo deberíamos ajustar nuestras ofertas y estrategias de gestión de riesgos en función de estos hallazgos? </a:t>
+            </a:r>
+          </a:p>
+          <a:p>
+            <a:endParaRPr lang="es-ES" sz="1400" b="1" dirty="0"/>
+          </a:p>
+        </p:txBody>
+      </p:sp>
+      <p:sp>
+        <p:nvSpPr>
+          <p:cNvPr id="20" name="CuadroTexto 19">
+            <a:extLst>
+              <a:ext uri="{FF2B5EF4-FFF2-40B4-BE49-F238E27FC236}">
+                <a16:creationId xmlns:a16="http://schemas.microsoft.com/office/drawing/2014/main" id="{8D4C4ABA-8C4D-3D1B-ADF0-41CF01169476}"/>
+              </a:ext>
+            </a:extLst>
+          </p:cNvPr>
+          <p:cNvSpPr txBox="1"/>
+          <p:nvPr/>
+        </p:nvSpPr>
+        <p:spPr>
+          <a:xfrm>
+            <a:off x="1977738" y="2935451"/>
+            <a:ext cx="3874361" cy="1208842"/>
+          </a:xfrm>
+          <a:prstGeom prst="roundRect">
+            <a:avLst/>
+          </a:prstGeom>
+          <a:noFill/>
+          <a:ln w="19050">
+            <a:solidFill>
+              <a:srgbClr val="FF8181"/>
+            </a:solidFill>
+            <a:prstDash val="sysDash"/>
+          </a:ln>
+        </p:spPr>
+        <p:txBody>
+          <a:bodyPr wrap="square">
+            <a:spAutoFit/>
+          </a:bodyPr>
+          <a:lstStyle/>
+          <a:p>
+            <a:pPr marL="171450" indent="-171450" algn="just">
+              <a:spcBef>
+                <a:spcPts val="300"/>
+              </a:spcBef>
+              <a:buFont typeface="Arial" panose="020B0604020202020204" pitchFamily="34" charset="0"/>
+              <a:buChar char="•"/>
+            </a:pPr>
+            <a:r>
+              <a:rPr lang="es-ES" sz="1200" dirty="0"/>
+              <a:t>Se piden más préstamos por necesidad que para artículos de lujo o para emprender.</a:t>
+            </a:r>
+          </a:p>
+          <a:p>
+            <a:pPr algn="just">
+              <a:spcBef>
+                <a:spcPts val="300"/>
+              </a:spcBef>
+            </a:pPr>
+            <a:endParaRPr lang="es-ES" sz="1200" dirty="0"/>
+          </a:p>
+          <a:p>
+            <a:pPr marL="171450" indent="-171450" algn="just">
+              <a:spcBef>
+                <a:spcPts val="300"/>
+              </a:spcBef>
+              <a:buFont typeface="Arial" panose="020B0604020202020204" pitchFamily="34" charset="0"/>
+              <a:buChar char="•"/>
+            </a:pPr>
+            <a:r>
+              <a:rPr lang="es-ES" sz="1200" dirty="0"/>
+              <a:t>Su flujo de efectivo es más frágil; al no tener mayor saldo, pueden incumplir con facilidad.</a:t>
+            </a:r>
+          </a:p>
+        </p:txBody>
+      </p:sp>
+      <p:sp>
+        <p:nvSpPr>
+          <p:cNvPr id="30" name="CuadroTexto 29">
+            <a:extLst>
+              <a:ext uri="{FF2B5EF4-FFF2-40B4-BE49-F238E27FC236}">
+                <a16:creationId xmlns:a16="http://schemas.microsoft.com/office/drawing/2014/main" id="{402A32AE-3750-DF58-DF17-E9552C34F130}"/>
+              </a:ext>
+            </a:extLst>
+          </p:cNvPr>
+          <p:cNvSpPr txBox="1"/>
+          <p:nvPr/>
+        </p:nvSpPr>
+        <p:spPr>
+          <a:xfrm>
+            <a:off x="1977738" y="4615143"/>
+            <a:ext cx="3874360" cy="1413153"/>
+          </a:xfrm>
+          <a:prstGeom prst="roundRect">
+            <a:avLst/>
+          </a:prstGeom>
+          <a:noFill/>
+          <a:ln w="19050">
+            <a:solidFill>
+              <a:srgbClr val="92D050"/>
+            </a:solidFill>
+            <a:prstDash val="sysDash"/>
+          </a:ln>
+        </p:spPr>
+        <p:txBody>
+          <a:bodyPr wrap="square">
+            <a:spAutoFit/>
+          </a:bodyPr>
+          <a:lstStyle/>
+          <a:p>
+            <a:pPr marL="171450" indent="-171450" algn="just">
+              <a:spcBef>
+                <a:spcPts val="300"/>
+              </a:spcBef>
+              <a:buFont typeface="Arial" panose="020B0604020202020204" pitchFamily="34" charset="0"/>
+              <a:buChar char="•"/>
+            </a:pPr>
+            <a:r>
+              <a:rPr lang="es-ES" sz="1200" dirty="0"/>
+              <a:t>Incentivar los préstamos para coches, etc. entre los que tienen mayor saldo con intereses menores.</a:t>
+            </a:r>
+          </a:p>
+          <a:p>
+            <a:pPr marL="171450" indent="-171450" algn="just">
+              <a:spcBef>
+                <a:spcPts val="300"/>
+              </a:spcBef>
+              <a:buFont typeface="Arial" panose="020B0604020202020204" pitchFamily="34" charset="0"/>
+              <a:buChar char="•"/>
+            </a:pPr>
+            <a:endParaRPr lang="es-ES" sz="1200" dirty="0"/>
+          </a:p>
+          <a:p>
+            <a:pPr marL="171450" indent="-171450" algn="just">
+              <a:spcBef>
+                <a:spcPts val="300"/>
+              </a:spcBef>
+              <a:buFont typeface="Arial" panose="020B0604020202020204" pitchFamily="34" charset="0"/>
+              <a:buChar char="•"/>
+            </a:pPr>
+            <a:r>
+              <a:rPr lang="es-ES" sz="1200" dirty="0"/>
+              <a:t>Revisar las condiciones de acceso a los préstamos:  Revisar el histórico de saldo del cliente y darle más o menos préstamo en función de eso.</a:t>
+            </a:r>
+          </a:p>
+        </p:txBody>
+      </p:sp>
+      <p:sp>
+        <p:nvSpPr>
+          <p:cNvPr id="31" name="Rectángulo: esquinas redondeadas 30">
+            <a:extLst>
+              <a:ext uri="{FF2B5EF4-FFF2-40B4-BE49-F238E27FC236}">
+                <a16:creationId xmlns:a16="http://schemas.microsoft.com/office/drawing/2014/main" id="{D6B14624-1CAA-6254-8320-9749CAB8ED3F}"/>
               </a:ext>
             </a:extLst>
           </p:cNvPr>
@@ -17719,25 +15514,19 @@
         </p:nvSpPr>
         <p:spPr>
           <a:xfrm>
-            <a:off x="1584671" y="4123667"/>
-            <a:ext cx="1620000" cy="1620000"/>
-          </a:xfrm>
-          <a:prstGeom prst="ellipse">
-            <a:avLst/>
+            <a:off x="6178044" y="1104371"/>
+            <a:ext cx="5508000" cy="5324706"/>
+          </a:xfrm>
+          <a:prstGeom prst="roundRect">
+            <a:avLst>
+              <a:gd name="adj" fmla="val 7845"/>
+            </a:avLst>
           </a:prstGeom>
           <a:solidFill>
-            <a:schemeClr val="accent5">
-              <a:lumMod val="25000"/>
-              <a:lumOff val="75000"/>
-            </a:schemeClr>
+            <a:schemeClr val="bg1"/>
           </a:solidFill>
           <a:ln>
-            <a:solidFill>
-              <a:schemeClr val="accent5">
-                <a:lumMod val="50000"/>
-                <a:lumOff val="50000"/>
-              </a:schemeClr>
-            </a:solidFill>
+            <a:noFill/>
           </a:ln>
         </p:spPr>
         <p:style>
@@ -17761,6 +15550,537 @@
           <a:lstStyle/>
           <a:p>
             <a:pPr algn="ctr"/>
+            <a:endParaRPr lang="es-ES"/>
+          </a:p>
+        </p:txBody>
+      </p:sp>
+      <p:sp>
+        <p:nvSpPr>
+          <p:cNvPr id="36" name="CuadroTexto 35">
+            <a:extLst>
+              <a:ext uri="{FF2B5EF4-FFF2-40B4-BE49-F238E27FC236}">
+                <a16:creationId xmlns:a16="http://schemas.microsoft.com/office/drawing/2014/main" id="{12B785AF-6D8C-51D9-4FE5-2410EE4A9C56}"/>
+              </a:ext>
+            </a:extLst>
+          </p:cNvPr>
+          <p:cNvSpPr txBox="1"/>
+          <p:nvPr/>
+        </p:nvSpPr>
+        <p:spPr>
+          <a:xfrm>
+            <a:off x="7696039" y="2773705"/>
+            <a:ext cx="3873600" cy="1532334"/>
+          </a:xfrm>
+          <a:prstGeom prst="roundRect">
+            <a:avLst/>
+          </a:prstGeom>
+          <a:noFill/>
+          <a:ln w="19050">
+            <a:solidFill>
+              <a:srgbClr val="FF8181"/>
+            </a:solidFill>
+            <a:prstDash val="sysDash"/>
+          </a:ln>
+        </p:spPr>
+        <p:txBody>
+          <a:bodyPr wrap="square">
+            <a:spAutoFit/>
+          </a:bodyPr>
+          <a:lstStyle>
+            <a:defPPr rtl="0">
+              <a:defRPr lang="es-es"/>
+            </a:defPPr>
+            <a:lvl1pPr algn="just">
+              <a:spcBef>
+                <a:spcPts val="300"/>
+              </a:spcBef>
+              <a:defRPr sz="1200" b="1"/>
+            </a:lvl1pPr>
+          </a:lstStyle>
+          <a:p>
+            <a:pPr marL="171450" indent="-171450">
+              <a:spcBef>
+                <a:spcPts val="0"/>
+              </a:spcBef>
+              <a:buFont typeface="Arial" panose="020B0604020202020204" pitchFamily="34" charset="0"/>
+              <a:buChar char="•"/>
+            </a:pPr>
+            <a:r>
+              <a:rPr lang="es-ES" b="0" dirty="0"/>
+              <a:t>Los clientes con hipotecas destinan gran parte de sus ingresos a éstas y, por ello, su saldo es menor y tienen mayor peligro de incumplimiento.</a:t>
+            </a:r>
+          </a:p>
+          <a:p>
+            <a:pPr>
+              <a:spcBef>
+                <a:spcPts val="0"/>
+              </a:spcBef>
+            </a:pPr>
+            <a:endParaRPr lang="es-ES" b="0" dirty="0"/>
+          </a:p>
+          <a:p>
+            <a:pPr marL="171450" indent="-171450">
+              <a:spcBef>
+                <a:spcPts val="0"/>
+              </a:spcBef>
+              <a:buFont typeface="Arial" panose="020B0604020202020204" pitchFamily="34" charset="0"/>
+              <a:buChar char="•"/>
+            </a:pPr>
+            <a:r>
+              <a:rPr lang="es-ES" b="0" dirty="0"/>
+              <a:t>Los que también tienen préstamo puede que lo hayan pedido para reformar la casa y eso sea una señal de que tienen más ingresos.</a:t>
+            </a:r>
+          </a:p>
+        </p:txBody>
+      </p:sp>
+      <p:sp>
+        <p:nvSpPr>
+          <p:cNvPr id="38" name="CuadroTexto 37">
+            <a:extLst>
+              <a:ext uri="{FF2B5EF4-FFF2-40B4-BE49-F238E27FC236}">
+                <a16:creationId xmlns:a16="http://schemas.microsoft.com/office/drawing/2014/main" id="{69CA13D8-495C-9FBC-E443-F90156725376}"/>
+              </a:ext>
+            </a:extLst>
+          </p:cNvPr>
+          <p:cNvSpPr txBox="1"/>
+          <p:nvPr/>
+        </p:nvSpPr>
+        <p:spPr>
+          <a:xfrm>
+            <a:off x="7696039" y="4555553"/>
+            <a:ext cx="3873600" cy="1532334"/>
+          </a:xfrm>
+          <a:prstGeom prst="roundRect">
+            <a:avLst/>
+          </a:prstGeom>
+          <a:noFill/>
+          <a:ln w="19050">
+            <a:solidFill>
+              <a:srgbClr val="92D050"/>
+            </a:solidFill>
+            <a:prstDash val="sysDash"/>
+          </a:ln>
+        </p:spPr>
+        <p:txBody>
+          <a:bodyPr wrap="square">
+            <a:spAutoFit/>
+          </a:bodyPr>
+          <a:lstStyle>
+            <a:defPPr rtl="0">
+              <a:defRPr lang="es-es"/>
+            </a:defPPr>
+            <a:lvl1pPr algn="just">
+              <a:spcBef>
+                <a:spcPts val="300"/>
+              </a:spcBef>
+              <a:defRPr sz="1200" b="1"/>
+            </a:lvl1pPr>
+          </a:lstStyle>
+          <a:p>
+            <a:pPr marL="171450" indent="-171450">
+              <a:spcBef>
+                <a:spcPts val="0"/>
+              </a:spcBef>
+              <a:buFont typeface="Arial" panose="020B0604020202020204" pitchFamily="34" charset="0"/>
+              <a:buChar char="•"/>
+            </a:pPr>
+            <a:r>
+              <a:rPr lang="es-ES" b="0" dirty="0"/>
+              <a:t>Ajustar las condiciones de las hipotecas a los ingresos reales de los clientes.</a:t>
+            </a:r>
+          </a:p>
+          <a:p>
+            <a:pPr marL="171450" indent="-171450">
+              <a:spcBef>
+                <a:spcPts val="0"/>
+              </a:spcBef>
+              <a:buFont typeface="Arial" panose="020B0604020202020204" pitchFamily="34" charset="0"/>
+              <a:buChar char="•"/>
+            </a:pPr>
+            <a:endParaRPr lang="es-ES" b="0" dirty="0"/>
+          </a:p>
+          <a:p>
+            <a:pPr marL="171450" indent="-171450">
+              <a:spcBef>
+                <a:spcPts val="0"/>
+              </a:spcBef>
+              <a:buFont typeface="Arial" panose="020B0604020202020204" pitchFamily="34" charset="0"/>
+              <a:buChar char="•"/>
+            </a:pPr>
+            <a:r>
+              <a:rPr lang="es-ES" b="0" dirty="0"/>
+              <a:t>Poder suavizar las condiciones puntualmente en caso de necesidad para que no caigan en impago: Congelar el pago de intereses y así bajar las cuotas por un determinado tiempo o alargar el periodo de pago.</a:t>
+            </a:r>
+          </a:p>
+        </p:txBody>
+      </p:sp>
+      <p:sp>
+        <p:nvSpPr>
+          <p:cNvPr id="41" name="Elipse 40">
+            <a:extLst>
+              <a:ext uri="{FF2B5EF4-FFF2-40B4-BE49-F238E27FC236}">
+                <a16:creationId xmlns:a16="http://schemas.microsoft.com/office/drawing/2014/main" id="{726B6686-6E30-955D-B112-5001E3992DB0}"/>
+              </a:ext>
+            </a:extLst>
+          </p:cNvPr>
+          <p:cNvSpPr/>
+          <p:nvPr/>
+        </p:nvSpPr>
+        <p:spPr>
+          <a:xfrm>
+            <a:off x="6371770" y="2954006"/>
+            <a:ext cx="1173600" cy="1171731"/>
+          </a:xfrm>
+          <a:prstGeom prst="ellipse">
+            <a:avLst/>
+          </a:prstGeom>
+          <a:solidFill>
+            <a:srgbClr val="FFB7B7"/>
+          </a:solidFill>
+          <a:ln>
+            <a:solidFill>
+              <a:srgbClr val="FF8181"/>
+            </a:solidFill>
+          </a:ln>
+        </p:spPr>
+        <p:style>
+          <a:lnRef idx="2">
+            <a:schemeClr val="accent1">
+              <a:shade val="50000"/>
+            </a:schemeClr>
+          </a:lnRef>
+          <a:fillRef idx="1">
+            <a:schemeClr val="accent1"/>
+          </a:fillRef>
+          <a:effectRef idx="0">
+            <a:schemeClr val="accent1"/>
+          </a:effectRef>
+          <a:fontRef idx="minor">
+            <a:schemeClr val="lt1"/>
+          </a:fontRef>
+        </p:style>
+        <p:txBody>
+          <a:bodyPr rtlCol="0" anchor="ctr"/>
+          <a:lstStyle/>
+          <a:p>
+            <a:pPr algn="ctr"/>
+            <a:r>
+              <a:rPr lang="es-ES" sz="1400" dirty="0">
+                <a:solidFill>
+                  <a:schemeClr val="tx1"/>
+                </a:solidFill>
+              </a:rPr>
+              <a:t>Posibles </a:t>
+            </a:r>
+            <a:r>
+              <a:rPr lang="es-ES" sz="1400" b="1" dirty="0">
+                <a:solidFill>
+                  <a:schemeClr val="tx1"/>
+                </a:solidFill>
+              </a:rPr>
+              <a:t>CAUSAS</a:t>
+            </a:r>
+          </a:p>
+        </p:txBody>
+      </p:sp>
+      <p:sp>
+        <p:nvSpPr>
+          <p:cNvPr id="42" name="Elipse 41">
+            <a:extLst>
+              <a:ext uri="{FF2B5EF4-FFF2-40B4-BE49-F238E27FC236}">
+                <a16:creationId xmlns:a16="http://schemas.microsoft.com/office/drawing/2014/main" id="{AEF366BB-8534-D16B-88EC-C0A8213619CC}"/>
+              </a:ext>
+            </a:extLst>
+          </p:cNvPr>
+          <p:cNvSpPr/>
+          <p:nvPr/>
+        </p:nvSpPr>
+        <p:spPr>
+          <a:xfrm>
+            <a:off x="6371770" y="4735858"/>
+            <a:ext cx="1173600" cy="1171731"/>
+          </a:xfrm>
+          <a:prstGeom prst="ellipse">
+            <a:avLst/>
+          </a:prstGeom>
+          <a:solidFill>
+            <a:srgbClr val="D2ECB6"/>
+          </a:solidFill>
+          <a:ln>
+            <a:solidFill>
+              <a:srgbClr val="92D050"/>
+            </a:solidFill>
+          </a:ln>
+        </p:spPr>
+        <p:style>
+          <a:lnRef idx="2">
+            <a:schemeClr val="accent1">
+              <a:shade val="50000"/>
+            </a:schemeClr>
+          </a:lnRef>
+          <a:fillRef idx="1">
+            <a:schemeClr val="accent1"/>
+          </a:fillRef>
+          <a:effectRef idx="0">
+            <a:schemeClr val="accent1"/>
+          </a:effectRef>
+          <a:fontRef idx="minor">
+            <a:schemeClr val="lt1"/>
+          </a:fontRef>
+        </p:style>
+        <p:txBody>
+          <a:bodyPr rtlCol="0" anchor="ctr"/>
+          <a:lstStyle/>
+          <a:p>
+            <a:pPr algn="ctr"/>
+            <a:r>
+              <a:rPr lang="es-ES" sz="1400" b="1" dirty="0">
+                <a:solidFill>
+                  <a:schemeClr val="tx1"/>
+                </a:solidFill>
+              </a:rPr>
+              <a:t>RECO-MENDA-CIONES</a:t>
+            </a:r>
+          </a:p>
+        </p:txBody>
+      </p:sp>
+      <p:sp>
+        <p:nvSpPr>
+          <p:cNvPr id="43" name="Elipse 42">
+            <a:extLst>
+              <a:ext uri="{FF2B5EF4-FFF2-40B4-BE49-F238E27FC236}">
+                <a16:creationId xmlns:a16="http://schemas.microsoft.com/office/drawing/2014/main" id="{4DA4281C-F29A-6A7D-C796-6AFA6C3869FF}"/>
+              </a:ext>
+            </a:extLst>
+          </p:cNvPr>
+          <p:cNvSpPr/>
+          <p:nvPr/>
+        </p:nvSpPr>
+        <p:spPr>
+          <a:xfrm>
+            <a:off x="622361" y="4735856"/>
+            <a:ext cx="1173600" cy="1171731"/>
+          </a:xfrm>
+          <a:prstGeom prst="ellipse">
+            <a:avLst/>
+          </a:prstGeom>
+          <a:solidFill>
+            <a:srgbClr val="D2ECB6"/>
+          </a:solidFill>
+          <a:ln>
+            <a:solidFill>
+              <a:srgbClr val="92D050"/>
+            </a:solidFill>
+          </a:ln>
+        </p:spPr>
+        <p:style>
+          <a:lnRef idx="2">
+            <a:schemeClr val="accent1">
+              <a:shade val="50000"/>
+            </a:schemeClr>
+          </a:lnRef>
+          <a:fillRef idx="1">
+            <a:schemeClr val="accent1"/>
+          </a:fillRef>
+          <a:effectRef idx="0">
+            <a:schemeClr val="accent1"/>
+          </a:effectRef>
+          <a:fontRef idx="minor">
+            <a:schemeClr val="lt1"/>
+          </a:fontRef>
+        </p:style>
+        <p:txBody>
+          <a:bodyPr rtlCol="0" anchor="ctr"/>
+          <a:lstStyle/>
+          <a:p>
+            <a:pPr algn="ctr"/>
+            <a:r>
+              <a:rPr lang="es-ES" sz="1400" b="1" dirty="0">
+                <a:solidFill>
+                  <a:schemeClr val="tx1"/>
+                </a:solidFill>
+              </a:rPr>
+              <a:t>RECO-MENDA-CIONES</a:t>
+            </a:r>
+          </a:p>
+        </p:txBody>
+      </p:sp>
+      <p:sp>
+        <p:nvSpPr>
+          <p:cNvPr id="44" name="Elipse 43">
+            <a:extLst>
+              <a:ext uri="{FF2B5EF4-FFF2-40B4-BE49-F238E27FC236}">
+                <a16:creationId xmlns:a16="http://schemas.microsoft.com/office/drawing/2014/main" id="{B3D7F275-3643-5356-F0BB-4663C892B949}"/>
+              </a:ext>
+            </a:extLst>
+          </p:cNvPr>
+          <p:cNvSpPr/>
+          <p:nvPr/>
+        </p:nvSpPr>
+        <p:spPr>
+          <a:xfrm>
+            <a:off x="618011" y="2954006"/>
+            <a:ext cx="1173600" cy="1171731"/>
+          </a:xfrm>
+          <a:prstGeom prst="ellipse">
+            <a:avLst/>
+          </a:prstGeom>
+          <a:solidFill>
+            <a:srgbClr val="FFB7B7"/>
+          </a:solidFill>
+          <a:ln>
+            <a:solidFill>
+              <a:srgbClr val="FF8181"/>
+            </a:solidFill>
+          </a:ln>
+        </p:spPr>
+        <p:style>
+          <a:lnRef idx="2">
+            <a:schemeClr val="accent1">
+              <a:shade val="50000"/>
+            </a:schemeClr>
+          </a:lnRef>
+          <a:fillRef idx="1">
+            <a:schemeClr val="accent1"/>
+          </a:fillRef>
+          <a:effectRef idx="0">
+            <a:schemeClr val="accent1"/>
+          </a:effectRef>
+          <a:fontRef idx="minor">
+            <a:schemeClr val="lt1"/>
+          </a:fontRef>
+        </p:style>
+        <p:txBody>
+          <a:bodyPr rtlCol="0" anchor="ctr"/>
+          <a:lstStyle/>
+          <a:p>
+            <a:pPr algn="ctr"/>
+            <a:r>
+              <a:rPr lang="es-ES" sz="1400" dirty="0">
+                <a:solidFill>
+                  <a:schemeClr val="tx1"/>
+                </a:solidFill>
+              </a:rPr>
+              <a:t>Posibles </a:t>
+            </a:r>
+            <a:r>
+              <a:rPr lang="es-ES" sz="1400" b="1" dirty="0">
+                <a:solidFill>
+                  <a:schemeClr val="tx1"/>
+                </a:solidFill>
+              </a:rPr>
+              <a:t>CAUSAS</a:t>
+            </a:r>
+          </a:p>
+        </p:txBody>
+      </p:sp>
+      <p:sp>
+        <p:nvSpPr>
+          <p:cNvPr id="2" name="QuadreDeText 1">
+            <a:extLst>
+              <a:ext uri="{FF2B5EF4-FFF2-40B4-BE49-F238E27FC236}">
+                <a16:creationId xmlns:a16="http://schemas.microsoft.com/office/drawing/2014/main" id="{80D1F29C-338D-A3A0-399C-DA986318401D}"/>
+              </a:ext>
+            </a:extLst>
+          </p:cNvPr>
+          <p:cNvSpPr txBox="1"/>
+          <p:nvPr/>
+        </p:nvSpPr>
+        <p:spPr>
+          <a:xfrm>
+            <a:off x="1977738" y="1546180"/>
+            <a:ext cx="3874361" cy="617733"/>
+          </a:xfrm>
+          <a:prstGeom prst="rect">
+            <a:avLst/>
+          </a:prstGeom>
+          <a:noFill/>
+        </p:spPr>
+        <p:txBody>
+          <a:bodyPr wrap="square">
+            <a:spAutoFit/>
+          </a:bodyPr>
+          <a:lstStyle>
+            <a:defPPr rtl="0">
+              <a:defRPr lang="es-es"/>
+            </a:defPPr>
+            <a:lvl1pPr>
+              <a:lnSpc>
+                <a:spcPct val="150000"/>
+              </a:lnSpc>
+              <a:defRPr/>
+            </a:lvl1pPr>
+          </a:lstStyle>
+          <a:p>
+            <a:r>
+              <a:rPr lang="es-ES" altLang="es-ES" sz="1200" b="1" dirty="0"/>
+              <a:t>Tienden a tener mucho menor saldo</a:t>
+            </a:r>
+          </a:p>
+          <a:p>
+            <a:r>
+              <a:rPr lang="es-ES" altLang="es-ES" sz="1200" b="1" dirty="0"/>
+              <a:t>Tienden a tener mucho más riesgo de incumplimiento</a:t>
+            </a:r>
+          </a:p>
+        </p:txBody>
+      </p:sp>
+      <p:sp>
+        <p:nvSpPr>
+          <p:cNvPr id="3" name="Elipse 2">
+            <a:extLst>
+              <a:ext uri="{FF2B5EF4-FFF2-40B4-BE49-F238E27FC236}">
+                <a16:creationId xmlns:a16="http://schemas.microsoft.com/office/drawing/2014/main" id="{2CAA5F33-D214-CC8B-A2D4-F415FAD0B231}"/>
+              </a:ext>
+            </a:extLst>
+          </p:cNvPr>
+          <p:cNvSpPr/>
+          <p:nvPr/>
+        </p:nvSpPr>
+        <p:spPr>
+          <a:xfrm>
+            <a:off x="618011" y="1296922"/>
+            <a:ext cx="1173600" cy="1120646"/>
+          </a:xfrm>
+          <a:prstGeom prst="ellipse">
+            <a:avLst/>
+          </a:prstGeom>
+          <a:solidFill>
+            <a:schemeClr val="accent5">
+              <a:lumMod val="25000"/>
+              <a:lumOff val="75000"/>
+            </a:schemeClr>
+          </a:solidFill>
+          <a:ln>
+            <a:solidFill>
+              <a:schemeClr val="accent5">
+                <a:lumMod val="50000"/>
+                <a:lumOff val="50000"/>
+              </a:schemeClr>
+            </a:solidFill>
+          </a:ln>
+        </p:spPr>
+        <p:style>
+          <a:lnRef idx="2">
+            <a:schemeClr val="accent1">
+              <a:shade val="50000"/>
+            </a:schemeClr>
+          </a:lnRef>
+          <a:fillRef idx="1">
+            <a:schemeClr val="accent1"/>
+          </a:fillRef>
+          <a:effectRef idx="0">
+            <a:schemeClr val="accent1"/>
+          </a:effectRef>
+          <a:fontRef idx="minor">
+            <a:schemeClr val="lt1"/>
+          </a:fontRef>
+        </p:style>
+        <p:txBody>
+          <a:bodyPr rtlCol="0" anchor="ctr"/>
+          <a:lstStyle/>
+          <a:p>
+            <a:pPr algn="ctr"/>
             <a:r>
               <a:rPr lang="es-ES" sz="1400" dirty="0">
                 <a:solidFill>
@@ -17778,17 +16098,95 @@
                   <a:schemeClr val="tx1"/>
                 </a:solidFill>
               </a:rPr>
-              <a:t>HIPOTECAS</a:t>
-            </a:r>
-          </a:p>
-        </p:txBody>
-      </p:sp>
-      <p:sp>
-        <p:nvSpPr>
-          <p:cNvPr id="7" name="CuadroTexto 6">
-            <a:extLst>
-              <a:ext uri="{FF2B5EF4-FFF2-40B4-BE49-F238E27FC236}">
-                <a16:creationId xmlns:a16="http://schemas.microsoft.com/office/drawing/2014/main" id="{292295D7-A0AA-6FFD-C472-DE7035C28F3B}"/>
+              <a:t>PRÉSTA-MOS</a:t>
+            </a:r>
+          </a:p>
+        </p:txBody>
+      </p:sp>
+      <p:sp>
+        <p:nvSpPr>
+          <p:cNvPr id="7" name="Elipse 3">
+            <a:extLst>
+              <a:ext uri="{FF2B5EF4-FFF2-40B4-BE49-F238E27FC236}">
+                <a16:creationId xmlns:a16="http://schemas.microsoft.com/office/drawing/2014/main" id="{B2B7A681-6DC4-190D-D9BA-75D280946319}"/>
+              </a:ext>
+            </a:extLst>
+          </p:cNvPr>
+          <p:cNvSpPr/>
+          <p:nvPr/>
+        </p:nvSpPr>
+        <p:spPr>
+          <a:xfrm>
+            <a:off x="6352873" y="1270070"/>
+            <a:ext cx="1186198" cy="1171731"/>
+          </a:xfrm>
+          <a:prstGeom prst="ellipse">
+            <a:avLst/>
+          </a:prstGeom>
+          <a:solidFill>
+            <a:schemeClr val="accent5">
+              <a:lumMod val="25000"/>
+              <a:lumOff val="75000"/>
+            </a:schemeClr>
+          </a:solidFill>
+          <a:ln>
+            <a:solidFill>
+              <a:schemeClr val="accent5">
+                <a:lumMod val="50000"/>
+                <a:lumOff val="50000"/>
+              </a:schemeClr>
+            </a:solidFill>
+          </a:ln>
+        </p:spPr>
+        <p:style>
+          <a:lnRef idx="2">
+            <a:schemeClr val="accent1">
+              <a:shade val="50000"/>
+            </a:schemeClr>
+          </a:lnRef>
+          <a:fillRef idx="1">
+            <a:schemeClr val="accent1"/>
+          </a:fillRef>
+          <a:effectRef idx="0">
+            <a:schemeClr val="accent1"/>
+          </a:effectRef>
+          <a:fontRef idx="minor">
+            <a:schemeClr val="lt1"/>
+          </a:fontRef>
+        </p:style>
+        <p:txBody>
+          <a:bodyPr rtlCol="0" anchor="ctr"/>
+          <a:lstStyle/>
+          <a:p>
+            <a:pPr algn="ctr"/>
+            <a:r>
+              <a:rPr lang="es-ES" sz="1400" dirty="0">
+                <a:solidFill>
+                  <a:schemeClr val="tx1"/>
+                </a:solidFill>
+              </a:rPr>
+              <a:t>Clientes con</a:t>
+            </a:r>
+          </a:p>
+          <a:p>
+            <a:pPr algn="ctr"/>
+            <a:r>
+              <a:rPr lang="es-ES" sz="1400" b="1" dirty="0">
+                <a:solidFill>
+                  <a:schemeClr val="tx1"/>
+                </a:solidFill>
+              </a:rPr>
+              <a:t>HIPOTE-CAS</a:t>
+            </a:r>
+          </a:p>
+        </p:txBody>
+      </p:sp>
+      <p:sp>
+        <p:nvSpPr>
+          <p:cNvPr id="8" name="CuadroTexto 6">
+            <a:extLst>
+              <a:ext uri="{FF2B5EF4-FFF2-40B4-BE49-F238E27FC236}">
+                <a16:creationId xmlns:a16="http://schemas.microsoft.com/office/drawing/2014/main" id="{153DFE94-1372-87D5-0DA0-DA5787B5D984}"/>
               </a:ext>
             </a:extLst>
           </p:cNvPr>
@@ -17797,8 +16195,8 @@
         </p:nvSpPr>
         <p:spPr>
           <a:xfrm>
-            <a:off x="3950972" y="4285733"/>
-            <a:ext cx="7049063" cy="1295868"/>
+            <a:off x="7713900" y="1347214"/>
+            <a:ext cx="3873600" cy="1015663"/>
           </a:xfrm>
           <a:prstGeom prst="rect">
             <a:avLst/>
@@ -17811,39 +16209,23 @@
           </a:bodyPr>
           <a:lstStyle/>
           <a:p>
-            <a:pPr>
-              <a:lnSpc>
-                <a:spcPct val="150000"/>
-              </a:lnSpc>
-            </a:pPr>
-            <a:r>
-              <a:rPr lang="es-ES" altLang="es-ES" dirty="0"/>
-              <a:t>T</a:t>
-            </a:r>
-            <a:r>
-              <a:rPr lang="es-ES" altLang="es-ES" sz="1800" dirty="0"/>
-              <a:t>ienden a tener un saldo un poco menor</a:t>
-            </a:r>
-          </a:p>
-          <a:p>
-            <a:pPr>
-              <a:lnSpc>
-                <a:spcPct val="150000"/>
-              </a:lnSpc>
-            </a:pPr>
-            <a:r>
-              <a:rPr lang="es-ES" altLang="es-ES" dirty="0"/>
+            <a:pPr algn="just"/>
+            <a:r>
+              <a:rPr lang="es-ES" altLang="es-ES" sz="1200" b="1" dirty="0"/>
+              <a:t>Tienden a tener un saldo un poco menor</a:t>
+            </a:r>
+          </a:p>
+          <a:p>
+            <a:pPr algn="just"/>
+            <a:r>
+              <a:rPr lang="es-ES" altLang="es-ES" sz="1200" b="1" dirty="0"/>
               <a:t>Tienden a tener un poco más de riesgo que los que no tienen préstamo</a:t>
             </a:r>
           </a:p>
           <a:p>
-            <a:pPr>
-              <a:lnSpc>
-                <a:spcPct val="150000"/>
-              </a:lnSpc>
-            </a:pPr>
-            <a:r>
-              <a:rPr lang="es-ES" altLang="es-ES" dirty="0"/>
+            <a:pPr algn="just"/>
+            <a:r>
+              <a:rPr lang="es-ES" altLang="es-ES" sz="1200" b="1" dirty="0"/>
               <a:t>Tienden a tener menor riesgo en los que tienen también préstamo</a:t>
             </a:r>
           </a:p>
@@ -17852,7 +16234,7 @@
     </p:spTree>
     <p:extLst>
       <p:ext uri="{BB962C8B-B14F-4D97-AF65-F5344CB8AC3E}">
-        <p14:creationId xmlns:p14="http://schemas.microsoft.com/office/powerpoint/2010/main" val="2582763781"/>
+        <p14:creationId xmlns:p14="http://schemas.microsoft.com/office/powerpoint/2010/main" val="1103751901"/>
       </p:ext>
     </p:extLst>
   </p:cSld>

</xml_diff>